<commit_message>
refactor scenario 1 formalization and update according to recent changes
</commit_message>
<xml_diff>
--- a/report/DA – Projeto 1 G12.pptx
+++ b/report/DA – Projeto 1 G12.pptx
@@ -8,19 +8,20 @@
     <p:sldId id="256" r:id="rId2"/>
     <p:sldId id="257" r:id="rId3"/>
     <p:sldId id="258" r:id="rId4"/>
-    <p:sldId id="259" r:id="rId5"/>
-    <p:sldId id="260" r:id="rId6"/>
-    <p:sldId id="261" r:id="rId7"/>
-    <p:sldId id="262" r:id="rId8"/>
-    <p:sldId id="263" r:id="rId9"/>
-    <p:sldId id="264" r:id="rId10"/>
-    <p:sldId id="265" r:id="rId11"/>
-    <p:sldId id="266" r:id="rId12"/>
-    <p:sldId id="267" r:id="rId13"/>
-    <p:sldId id="268" r:id="rId14"/>
-    <p:sldId id="269" r:id="rId15"/>
-    <p:sldId id="271" r:id="rId16"/>
-    <p:sldId id="272" r:id="rId17"/>
+    <p:sldId id="273" r:id="rId5"/>
+    <p:sldId id="259" r:id="rId6"/>
+    <p:sldId id="260" r:id="rId7"/>
+    <p:sldId id="261" r:id="rId8"/>
+    <p:sldId id="262" r:id="rId9"/>
+    <p:sldId id="263" r:id="rId10"/>
+    <p:sldId id="264" r:id="rId11"/>
+    <p:sldId id="265" r:id="rId12"/>
+    <p:sldId id="266" r:id="rId13"/>
+    <p:sldId id="267" r:id="rId14"/>
+    <p:sldId id="268" r:id="rId15"/>
+    <p:sldId id="269" r:id="rId16"/>
+    <p:sldId id="271" r:id="rId17"/>
+    <p:sldId id="272" r:id="rId18"/>
   </p:sldIdLst>
   <p:sldSz cx="12192000" cy="6858000"/>
   <p:notesSz cx="6858000" cy="9144000"/>
@@ -274,7 +275,7 @@
           <a:p>
             <a:fld id="{2E5CEBE5-D61B-41F8-812F-9EAE0199E150}" type="datetimeFigureOut">
               <a:rPr lang="pt-PT" smtClean="0"/>
-              <a:t>20/04/2022</a:t>
+              <a:t>21/04/2022</a:t>
             </a:fld>
             <a:endParaRPr lang="pt-PT"/>
           </a:p>
@@ -472,7 +473,7 @@
           <a:p>
             <a:fld id="{2E5CEBE5-D61B-41F8-812F-9EAE0199E150}" type="datetimeFigureOut">
               <a:rPr lang="pt-PT" smtClean="0"/>
-              <a:t>20/04/2022</a:t>
+              <a:t>21/04/2022</a:t>
             </a:fld>
             <a:endParaRPr lang="pt-PT"/>
           </a:p>
@@ -680,7 +681,7 @@
           <a:p>
             <a:fld id="{2E5CEBE5-D61B-41F8-812F-9EAE0199E150}" type="datetimeFigureOut">
               <a:rPr lang="pt-PT" smtClean="0"/>
-              <a:t>20/04/2022</a:t>
+              <a:t>21/04/2022</a:t>
             </a:fld>
             <a:endParaRPr lang="pt-PT"/>
           </a:p>
@@ -878,7 +879,7 @@
           <a:p>
             <a:fld id="{2E5CEBE5-D61B-41F8-812F-9EAE0199E150}" type="datetimeFigureOut">
               <a:rPr lang="pt-PT" smtClean="0"/>
-              <a:t>20/04/2022</a:t>
+              <a:t>21/04/2022</a:t>
             </a:fld>
             <a:endParaRPr lang="pt-PT"/>
           </a:p>
@@ -1153,7 +1154,7 @@
           <a:p>
             <a:fld id="{2E5CEBE5-D61B-41F8-812F-9EAE0199E150}" type="datetimeFigureOut">
               <a:rPr lang="pt-PT" smtClean="0"/>
-              <a:t>20/04/2022</a:t>
+              <a:t>21/04/2022</a:t>
             </a:fld>
             <a:endParaRPr lang="pt-PT"/>
           </a:p>
@@ -1418,7 +1419,7 @@
           <a:p>
             <a:fld id="{2E5CEBE5-D61B-41F8-812F-9EAE0199E150}" type="datetimeFigureOut">
               <a:rPr lang="pt-PT" smtClean="0"/>
-              <a:t>20/04/2022</a:t>
+              <a:t>21/04/2022</a:t>
             </a:fld>
             <a:endParaRPr lang="pt-PT"/>
           </a:p>
@@ -1830,7 +1831,7 @@
           <a:p>
             <a:fld id="{2E5CEBE5-D61B-41F8-812F-9EAE0199E150}" type="datetimeFigureOut">
               <a:rPr lang="pt-PT" smtClean="0"/>
-              <a:t>20/04/2022</a:t>
+              <a:t>21/04/2022</a:t>
             </a:fld>
             <a:endParaRPr lang="pt-PT"/>
           </a:p>
@@ -1971,7 +1972,7 @@
           <a:p>
             <a:fld id="{2E5CEBE5-D61B-41F8-812F-9EAE0199E150}" type="datetimeFigureOut">
               <a:rPr lang="pt-PT" smtClean="0"/>
-              <a:t>20/04/2022</a:t>
+              <a:t>21/04/2022</a:t>
             </a:fld>
             <a:endParaRPr lang="pt-PT"/>
           </a:p>
@@ -2084,7 +2085,7 @@
           <a:p>
             <a:fld id="{2E5CEBE5-D61B-41F8-812F-9EAE0199E150}" type="datetimeFigureOut">
               <a:rPr lang="pt-PT" smtClean="0"/>
-              <a:t>20/04/2022</a:t>
+              <a:t>21/04/2022</a:t>
             </a:fld>
             <a:endParaRPr lang="pt-PT"/>
           </a:p>
@@ -2395,7 +2396,7 @@
           <a:p>
             <a:fld id="{2E5CEBE5-D61B-41F8-812F-9EAE0199E150}" type="datetimeFigureOut">
               <a:rPr lang="pt-PT" smtClean="0"/>
-              <a:t>20/04/2022</a:t>
+              <a:t>21/04/2022</a:t>
             </a:fld>
             <a:endParaRPr lang="pt-PT"/>
           </a:p>
@@ -2683,7 +2684,7 @@
           <a:p>
             <a:fld id="{2E5CEBE5-D61B-41F8-812F-9EAE0199E150}" type="datetimeFigureOut">
               <a:rPr lang="pt-PT" smtClean="0"/>
-              <a:t>20/04/2022</a:t>
+              <a:t>21/04/2022</a:t>
             </a:fld>
             <a:endParaRPr lang="pt-PT"/>
           </a:p>
@@ -2924,7 +2925,7 @@
           <a:p>
             <a:fld id="{2E5CEBE5-D61B-41F8-812F-9EAE0199E150}" type="datetimeFigureOut">
               <a:rPr lang="pt-PT" smtClean="0"/>
-              <a:t>20/04/2022</a:t>
+              <a:t>21/04/2022</a:t>
             </a:fld>
             <a:endParaRPr lang="pt-PT"/>
           </a:p>
@@ -3498,7 +3499,7 @@
           <p:cNvPr id="2" name="Título 1">
             <a:extLst>
               <a:ext uri="{FF2B5EF4-FFF2-40B4-BE49-F238E27FC236}">
-                <a16:creationId xmlns:a16="http://schemas.microsoft.com/office/drawing/2014/main" id="{46F91783-8BE7-41E4-BBFB-2F4869B8964F}"/>
+                <a16:creationId xmlns:a16="http://schemas.microsoft.com/office/drawing/2014/main" id="{3DB0E28C-6EE9-49F5-A1DC-00CDB48D4B1E}"/>
               </a:ext>
             </a:extLst>
           </p:cNvPr>
@@ -3516,7 +3517,7 @@
           <a:p>
             <a:r>
               <a:rPr lang="pt-PT" dirty="0"/>
-              <a:t>Cenário 2 - Resultados</a:t>
+              <a:t>Cenário 2 – Análise da complexidade</a:t>
             </a:r>
           </a:p>
         </p:txBody>
@@ -3526,7 +3527,7 @@
           <p:cNvPr id="3" name="Marcador de Posição de Conteúdo 2">
             <a:extLst>
               <a:ext uri="{FF2B5EF4-FFF2-40B4-BE49-F238E27FC236}">
-                <a16:creationId xmlns:a16="http://schemas.microsoft.com/office/drawing/2014/main" id="{41CD9802-94BF-4B8D-8FD9-BF0EC7801C3B}"/>
+                <a16:creationId xmlns:a16="http://schemas.microsoft.com/office/drawing/2014/main" id="{C706ACC0-DD3C-4491-9F85-1554F9FDC296}"/>
               </a:ext>
             </a:extLst>
           </p:cNvPr>
@@ -3544,7 +3545,21 @@
           <a:p>
             <a:r>
               <a:rPr lang="pt-PT" dirty="0"/>
-              <a:t>Nas experiências efetuadas, observamos uma melhor eficiência na 2ª variante.</a:t>
+              <a:t>As ordenações têm complexidade O(V log V + E log E).</a:t>
+            </a:r>
+          </a:p>
+          <a:p>
+            <a:r>
+              <a:rPr lang="pt-PT" dirty="0"/>
+              <a:t>A atribuição de encomendas a estafetas tem complexidade O(V * E) no pior dos casos, em que V são os estafetas e </a:t>
+            </a:r>
+            <a:r>
+              <a:rPr lang="pt-PT" dirty="0" err="1"/>
+              <a:t>E</a:t>
+            </a:r>
+            <a:r>
+              <a:rPr lang="pt-PT" dirty="0"/>
+              <a:t> as encomendas.</a:t>
             </a:r>
           </a:p>
         </p:txBody>
@@ -3552,7 +3567,7 @@
     </p:spTree>
     <p:extLst>
       <p:ext uri="{BB962C8B-B14F-4D97-AF65-F5344CB8AC3E}">
-        <p14:creationId xmlns:p14="http://schemas.microsoft.com/office/powerpoint/2010/main" val="641879914"/>
+        <p14:creationId xmlns:p14="http://schemas.microsoft.com/office/powerpoint/2010/main" val="3392007634"/>
       </p:ext>
     </p:extLst>
   </p:cSld>
@@ -3584,7 +3599,7 @@
           <p:cNvPr id="2" name="Título 1">
             <a:extLst>
               <a:ext uri="{FF2B5EF4-FFF2-40B4-BE49-F238E27FC236}">
-                <a16:creationId xmlns:a16="http://schemas.microsoft.com/office/drawing/2014/main" id="{889D2820-013D-43A2-9582-CDA470CF707E}"/>
+                <a16:creationId xmlns:a16="http://schemas.microsoft.com/office/drawing/2014/main" id="{46F91783-8BE7-41E4-BBFB-2F4869B8964F}"/>
               </a:ext>
             </a:extLst>
           </p:cNvPr>
@@ -3602,7 +3617,7 @@
           <a:p>
             <a:r>
               <a:rPr lang="pt-PT" dirty="0"/>
-              <a:t>Cenário 3 - Formalização</a:t>
+              <a:t>Cenário 2 - Resultados</a:t>
             </a:r>
           </a:p>
         </p:txBody>
@@ -3612,7 +3627,7 @@
           <p:cNvPr id="3" name="Marcador de Posição de Conteúdo 2">
             <a:extLst>
               <a:ext uri="{FF2B5EF4-FFF2-40B4-BE49-F238E27FC236}">
-                <a16:creationId xmlns:a16="http://schemas.microsoft.com/office/drawing/2014/main" id="{3A798BAF-D051-4085-8A9B-11B23551D316}"/>
+                <a16:creationId xmlns:a16="http://schemas.microsoft.com/office/drawing/2014/main" id="{41CD9802-94BF-4B8D-8FD9-BF0EC7801C3B}"/>
               </a:ext>
             </a:extLst>
           </p:cNvPr>
@@ -3625,87 +3640,12 @@
         </p:nvSpPr>
         <p:spPr/>
         <p:txBody>
-          <a:bodyPr>
-            <a:normAutofit fontScale="92500" lnSpcReduction="10000"/>
-          </a:bodyPr>
-          <a:lstStyle/>
-          <a:p>
-            <a:r>
-              <a:rPr lang="pt-PT" dirty="0"/>
-              <a:t>Variáveis de decisão:</a:t>
-            </a:r>
-          </a:p>
-          <a:p>
-            <a:pPr lvl="1"/>
-            <a:r>
-              <a:rPr lang="pt-PT" dirty="0"/>
-              <a:t>t, tempo médio de entrega das encomendas</a:t>
-            </a:r>
-          </a:p>
-          <a:p>
-            <a:pPr lvl="1"/>
-            <a:r>
-              <a:rPr lang="pt-PT" dirty="0"/>
-              <a:t>n, número de encomendas entregues</a:t>
-            </a:r>
-          </a:p>
-          <a:p>
-            <a:pPr marL="457200" lvl="1" indent="0">
-              <a:buNone/>
-            </a:pPr>
-            <a:endParaRPr lang="pt-PT" dirty="0"/>
-          </a:p>
-          <a:p>
-            <a:r>
-              <a:rPr lang="pt-PT" dirty="0"/>
-              <a:t>Restrições:</a:t>
-            </a:r>
-          </a:p>
-          <a:p>
-            <a:pPr lvl="1"/>
-            <a:r>
-              <a:rPr lang="pt-PT" dirty="0"/>
-              <a:t>Não exceder o número de encomendas disponíveis.</a:t>
-            </a:r>
-          </a:p>
-          <a:p>
-            <a:pPr lvl="1"/>
-            <a:r>
-              <a:rPr lang="pt-PT" dirty="0"/>
-              <a:t>O tempo total de entrega das encomendas não pode exceder 8 horas.</a:t>
-            </a:r>
-          </a:p>
-          <a:p>
-            <a:pPr lvl="1"/>
-            <a:r>
-              <a:rPr lang="pt-PT" dirty="0"/>
-              <a:t>As variáveis de decisão assumem valores reais positivos.</a:t>
-            </a:r>
-          </a:p>
-          <a:p>
-            <a:pPr marL="457200" lvl="1" indent="0">
-              <a:buNone/>
-            </a:pPr>
-            <a:endParaRPr lang="pt-PT" dirty="0"/>
-          </a:p>
-          <a:p>
-            <a:r>
-              <a:rPr lang="pt-PT" dirty="0"/>
-              <a:t>Objetivo:</a:t>
-            </a:r>
-          </a:p>
-          <a:p>
-            <a:pPr lvl="1"/>
-            <a:r>
-              <a:rPr lang="pt-PT" dirty="0"/>
-              <a:t>Minimizar t</a:t>
-            </a:r>
-          </a:p>
-          <a:p>
-            <a:pPr lvl="1"/>
-            <a:r>
-              <a:rPr lang="pt-PT" dirty="0"/>
-              <a:t>Maximizar n</a:t>
+          <a:bodyPr/>
+          <a:lstStyle/>
+          <a:p>
+            <a:r>
+              <a:rPr lang="pt-PT" dirty="0"/>
+              <a:t>Nas experiências efetuadas, observamos uma melhor eficiência na 2ª variante, em que se divide o produto do peso pelo volume pelo custo do transporte.</a:t>
             </a:r>
           </a:p>
         </p:txBody>
@@ -3713,7 +3653,7 @@
     </p:spTree>
     <p:extLst>
       <p:ext uri="{BB962C8B-B14F-4D97-AF65-F5344CB8AC3E}">
-        <p14:creationId xmlns:p14="http://schemas.microsoft.com/office/powerpoint/2010/main" val="100257538"/>
+        <p14:creationId xmlns:p14="http://schemas.microsoft.com/office/powerpoint/2010/main" val="641879914"/>
       </p:ext>
     </p:extLst>
   </p:cSld>
@@ -3745,7 +3685,7 @@
           <p:cNvPr id="2" name="Título 1">
             <a:extLst>
               <a:ext uri="{FF2B5EF4-FFF2-40B4-BE49-F238E27FC236}">
-                <a16:creationId xmlns:a16="http://schemas.microsoft.com/office/drawing/2014/main" id="{D707D466-085B-4EE3-A77E-6A8C9FE37630}"/>
+                <a16:creationId xmlns:a16="http://schemas.microsoft.com/office/drawing/2014/main" id="{889D2820-013D-43A2-9582-CDA470CF707E}"/>
               </a:ext>
             </a:extLst>
           </p:cNvPr>
@@ -3763,7 +3703,7 @@
           <a:p>
             <a:r>
               <a:rPr lang="pt-PT" dirty="0"/>
-              <a:t>Cenário 3 – Algoritmos relevantes</a:t>
+              <a:t>Cenário 3 - Formalização</a:t>
             </a:r>
           </a:p>
         </p:txBody>
@@ -3773,7 +3713,7 @@
           <p:cNvPr id="3" name="Marcador de Posição de Conteúdo 2">
             <a:extLst>
               <a:ext uri="{FF2B5EF4-FFF2-40B4-BE49-F238E27FC236}">
-                <a16:creationId xmlns:a16="http://schemas.microsoft.com/office/drawing/2014/main" id="{2DF92700-8928-4D19-AFF8-0C3BBBD7BAB1}"/>
+                <a16:creationId xmlns:a16="http://schemas.microsoft.com/office/drawing/2014/main" id="{3A798BAF-D051-4085-8A9B-11B23551D316}"/>
               </a:ext>
             </a:extLst>
           </p:cNvPr>
@@ -3786,18 +3726,87 @@
         </p:nvSpPr>
         <p:spPr/>
         <p:txBody>
-          <a:bodyPr/>
-          <a:lstStyle/>
-          <a:p>
-            <a:r>
-              <a:rPr lang="pt-PT" dirty="0"/>
-              <a:t>Ordenamos as encomendas por ordem crescente de tempo de entrega.</a:t>
-            </a:r>
-          </a:p>
-          <a:p>
-            <a:r>
-              <a:rPr lang="pt-PT" dirty="0"/>
-              <a:t>Enquanto a soma dos tempos de entrega das encomendas não excede 8 horas, selecionamos encomendas para serem entregues.</a:t>
+          <a:bodyPr>
+            <a:normAutofit fontScale="92500" lnSpcReduction="10000"/>
+          </a:bodyPr>
+          <a:lstStyle/>
+          <a:p>
+            <a:r>
+              <a:rPr lang="pt-PT" dirty="0"/>
+              <a:t>Variáveis de decisão:</a:t>
+            </a:r>
+          </a:p>
+          <a:p>
+            <a:pPr lvl="1"/>
+            <a:r>
+              <a:rPr lang="pt-PT" dirty="0"/>
+              <a:t>t, tempo médio de entrega das encomendas</a:t>
+            </a:r>
+          </a:p>
+          <a:p>
+            <a:pPr lvl="1"/>
+            <a:r>
+              <a:rPr lang="pt-PT" dirty="0"/>
+              <a:t>n, número de encomendas entregues</a:t>
+            </a:r>
+          </a:p>
+          <a:p>
+            <a:pPr marL="457200" lvl="1" indent="0">
+              <a:buNone/>
+            </a:pPr>
+            <a:endParaRPr lang="pt-PT" dirty="0"/>
+          </a:p>
+          <a:p>
+            <a:r>
+              <a:rPr lang="pt-PT" dirty="0"/>
+              <a:t>Restrições:</a:t>
+            </a:r>
+          </a:p>
+          <a:p>
+            <a:pPr lvl="1"/>
+            <a:r>
+              <a:rPr lang="pt-PT" dirty="0"/>
+              <a:t>Não exceder o número de encomendas disponíveis.</a:t>
+            </a:r>
+          </a:p>
+          <a:p>
+            <a:pPr lvl="1"/>
+            <a:r>
+              <a:rPr lang="pt-PT" dirty="0"/>
+              <a:t>O tempo total de entrega das encomendas não pode exceder 8 horas.</a:t>
+            </a:r>
+          </a:p>
+          <a:p>
+            <a:pPr lvl="1"/>
+            <a:r>
+              <a:rPr lang="pt-PT" dirty="0"/>
+              <a:t>As variáveis de decisão assumem valores reais positivos.</a:t>
+            </a:r>
+          </a:p>
+          <a:p>
+            <a:pPr marL="457200" lvl="1" indent="0">
+              <a:buNone/>
+            </a:pPr>
+            <a:endParaRPr lang="pt-PT" dirty="0"/>
+          </a:p>
+          <a:p>
+            <a:r>
+              <a:rPr lang="pt-PT" dirty="0"/>
+              <a:t>Objetivo:</a:t>
+            </a:r>
+          </a:p>
+          <a:p>
+            <a:pPr lvl="1"/>
+            <a:r>
+              <a:rPr lang="pt-PT" dirty="0"/>
+              <a:t>Minimizar t</a:t>
+            </a:r>
+          </a:p>
+          <a:p>
+            <a:pPr lvl="1"/>
+            <a:r>
+              <a:rPr lang="pt-PT" dirty="0"/>
+              <a:t>Maximizar n</a:t>
             </a:r>
           </a:p>
         </p:txBody>
@@ -3805,7 +3814,7 @@
     </p:spTree>
     <p:extLst>
       <p:ext uri="{BB962C8B-B14F-4D97-AF65-F5344CB8AC3E}">
-        <p14:creationId xmlns:p14="http://schemas.microsoft.com/office/powerpoint/2010/main" val="1146427195"/>
+        <p14:creationId xmlns:p14="http://schemas.microsoft.com/office/powerpoint/2010/main" val="100257538"/>
       </p:ext>
     </p:extLst>
   </p:cSld>
@@ -3837,7 +3846,7 @@
           <p:cNvPr id="2" name="Título 1">
             <a:extLst>
               <a:ext uri="{FF2B5EF4-FFF2-40B4-BE49-F238E27FC236}">
-                <a16:creationId xmlns:a16="http://schemas.microsoft.com/office/drawing/2014/main" id="{6BA6702A-DC80-4358-8A4C-55923BF4F079}"/>
+                <a16:creationId xmlns:a16="http://schemas.microsoft.com/office/drawing/2014/main" id="{D707D466-085B-4EE3-A77E-6A8C9FE37630}"/>
               </a:ext>
             </a:extLst>
           </p:cNvPr>
@@ -3855,7 +3864,7 @@
           <a:p>
             <a:r>
               <a:rPr lang="pt-PT" dirty="0"/>
-              <a:t>Cenário 3 – Análise da complexidade</a:t>
+              <a:t>Cenário 3 – Algoritmos relevantes</a:t>
             </a:r>
           </a:p>
         </p:txBody>
@@ -3865,7 +3874,7 @@
           <p:cNvPr id="3" name="Marcador de Posição de Conteúdo 2">
             <a:extLst>
               <a:ext uri="{FF2B5EF4-FFF2-40B4-BE49-F238E27FC236}">
-                <a16:creationId xmlns:a16="http://schemas.microsoft.com/office/drawing/2014/main" id="{65994F13-690D-4BF3-BF1E-DF8F1C7052B5}"/>
+                <a16:creationId xmlns:a16="http://schemas.microsoft.com/office/drawing/2014/main" id="{2DF92700-8928-4D19-AFF8-0C3BBBD7BAB1}"/>
               </a:ext>
             </a:extLst>
           </p:cNvPr>
@@ -3883,13 +3892,13 @@
           <a:p>
             <a:r>
               <a:rPr lang="pt-PT" dirty="0"/>
-              <a:t>A complexidade temporal da ordenação das encomendas é (E log E), em que E representa o número de encomendas.</a:t>
-            </a:r>
-          </a:p>
-          <a:p>
-            <a:r>
-              <a:rPr lang="pt-PT" dirty="0"/>
-              <a:t>A complexidade temporal da seleção de encomendas para serem entregues é O(E).</a:t>
+              <a:t>Ordenamos as encomendas por ordem crescente de tempo de entrega.</a:t>
+            </a:r>
+          </a:p>
+          <a:p>
+            <a:r>
+              <a:rPr lang="pt-PT" dirty="0"/>
+              <a:t>Enquanto a soma dos tempos de entrega das encomendas não excede 8 horas, selecionamos encomendas para serem entregues.</a:t>
             </a:r>
           </a:p>
         </p:txBody>
@@ -3897,7 +3906,7 @@
     </p:spTree>
     <p:extLst>
       <p:ext uri="{BB962C8B-B14F-4D97-AF65-F5344CB8AC3E}">
-        <p14:creationId xmlns:p14="http://schemas.microsoft.com/office/powerpoint/2010/main" val="656235498"/>
+        <p14:creationId xmlns:p14="http://schemas.microsoft.com/office/powerpoint/2010/main" val="1146427195"/>
       </p:ext>
     </p:extLst>
   </p:cSld>
@@ -3929,7 +3938,7 @@
           <p:cNvPr id="2" name="Título 1">
             <a:extLst>
               <a:ext uri="{FF2B5EF4-FFF2-40B4-BE49-F238E27FC236}">
-                <a16:creationId xmlns:a16="http://schemas.microsoft.com/office/drawing/2014/main" id="{B52F2C43-3249-4471-81AD-165EEEF03111}"/>
+                <a16:creationId xmlns:a16="http://schemas.microsoft.com/office/drawing/2014/main" id="{6BA6702A-DC80-4358-8A4C-55923BF4F079}"/>
               </a:ext>
             </a:extLst>
           </p:cNvPr>
@@ -3947,7 +3956,7 @@
           <a:p>
             <a:r>
               <a:rPr lang="pt-PT" dirty="0"/>
-              <a:t>Cenário 3 - Resultados</a:t>
+              <a:t>Cenário 3 – Análise da complexidade</a:t>
             </a:r>
           </a:p>
         </p:txBody>
@@ -3957,7 +3966,7 @@
           <p:cNvPr id="3" name="Marcador de Posição de Conteúdo 2">
             <a:extLst>
               <a:ext uri="{FF2B5EF4-FFF2-40B4-BE49-F238E27FC236}">
-                <a16:creationId xmlns:a16="http://schemas.microsoft.com/office/drawing/2014/main" id="{920DA812-F4C1-464A-9F00-2858BE092913}"/>
+                <a16:creationId xmlns:a16="http://schemas.microsoft.com/office/drawing/2014/main" id="{65994F13-690D-4BF3-BF1E-DF8F1C7052B5}"/>
               </a:ext>
             </a:extLst>
           </p:cNvPr>
@@ -3975,7 +3984,13 @@
           <a:p>
             <a:r>
               <a:rPr lang="pt-PT" dirty="0"/>
-              <a:t>Desta forma, estamos a maximizar o número de encomendas entregues enquanto mantemos o tempo médio de entrega o mínimo possível.</a:t>
+              <a:t>A complexidade temporal da ordenação das encomendas é (E log E), em que E representa o número de encomendas.</a:t>
+            </a:r>
+          </a:p>
+          <a:p>
+            <a:r>
+              <a:rPr lang="pt-PT" dirty="0"/>
+              <a:t>A complexidade temporal da seleção de encomendas para serem entregues é O(E).</a:t>
             </a:r>
           </a:p>
         </p:txBody>
@@ -3983,7 +3998,7 @@
     </p:spTree>
     <p:extLst>
       <p:ext uri="{BB962C8B-B14F-4D97-AF65-F5344CB8AC3E}">
-        <p14:creationId xmlns:p14="http://schemas.microsoft.com/office/powerpoint/2010/main" val="4137157775"/>
+        <p14:creationId xmlns:p14="http://schemas.microsoft.com/office/powerpoint/2010/main" val="656235498"/>
       </p:ext>
     </p:extLst>
   </p:cSld>
@@ -4015,7 +4030,7 @@
           <p:cNvPr id="2" name="Título 1">
             <a:extLst>
               <a:ext uri="{FF2B5EF4-FFF2-40B4-BE49-F238E27FC236}">
-                <a16:creationId xmlns:a16="http://schemas.microsoft.com/office/drawing/2014/main" id="{60B5EF03-1172-4466-9B55-CDEAFC811BA5}"/>
+                <a16:creationId xmlns:a16="http://schemas.microsoft.com/office/drawing/2014/main" id="{B52F2C43-3249-4471-81AD-165EEEF03111}"/>
               </a:ext>
             </a:extLst>
           </p:cNvPr>
@@ -4033,7 +4048,7 @@
           <a:p>
             <a:r>
               <a:rPr lang="pt-PT" dirty="0"/>
-              <a:t>Solução algorítmica em destaque</a:t>
+              <a:t>Cenário 3 - Resultados</a:t>
             </a:r>
           </a:p>
         </p:txBody>
@@ -4043,7 +4058,7 @@
           <p:cNvPr id="3" name="Marcador de Posição de Conteúdo 2">
             <a:extLst>
               <a:ext uri="{FF2B5EF4-FFF2-40B4-BE49-F238E27FC236}">
-                <a16:creationId xmlns:a16="http://schemas.microsoft.com/office/drawing/2014/main" id="{8281AF53-B423-4602-ADDC-773ADF36EDDB}"/>
+                <a16:creationId xmlns:a16="http://schemas.microsoft.com/office/drawing/2014/main" id="{920DA812-F4C1-464A-9F00-2858BE092913}"/>
               </a:ext>
             </a:extLst>
           </p:cNvPr>
@@ -4056,59 +4071,12 @@
         </p:nvSpPr>
         <p:spPr/>
         <p:txBody>
-          <a:bodyPr>
-            <a:normAutofit/>
-          </a:bodyPr>
-          <a:lstStyle/>
-          <a:p>
-            <a:r>
-              <a:rPr lang="pt-PT" dirty="0"/>
-              <a:t>A solução mais trivial para atribuir encomendas a estafetas seria fazer dois for </a:t>
-            </a:r>
-            <a:r>
-              <a:rPr lang="pt-PT" dirty="0" err="1"/>
-              <a:t>loops</a:t>
-            </a:r>
-            <a:r>
-              <a:rPr lang="pt-PT" dirty="0"/>
-              <a:t>, um que percorre os estafetas e outro que percorre as encomendas, o que se traduziria em complexidade temporal O(V * E).</a:t>
-            </a:r>
-          </a:p>
-          <a:p>
-            <a:r>
-              <a:rPr lang="pt-PT" dirty="0"/>
-              <a:t>Com o nosso algoritmo, conseguimos complexidade temporal de  </a:t>
-            </a:r>
-          </a:p>
-          <a:p>
-            <a:pPr marL="0" indent="0">
-              <a:buNone/>
-            </a:pPr>
-            <a:r>
-              <a:rPr lang="pt-PT" dirty="0"/>
-              <a:t>O(V + E) num </a:t>
-            </a:r>
-            <a:r>
-              <a:rPr lang="pt-PT" dirty="0" err="1"/>
-              <a:t>while</a:t>
-            </a:r>
-            <a:r>
-              <a:rPr lang="pt-PT" dirty="0"/>
-              <a:t> </a:t>
-            </a:r>
-            <a:r>
-              <a:rPr lang="pt-PT" dirty="0" err="1"/>
-              <a:t>loop</a:t>
-            </a:r>
-            <a:r>
-              <a:rPr lang="pt-PT" dirty="0"/>
-              <a:t>.</a:t>
-            </a:r>
-          </a:p>
-          <a:p>
-            <a:r>
-              <a:rPr lang="pt-PT" dirty="0"/>
-              <a:t>Esta última operação é especialmente dominada pelas encomendas, que normalmente se encontram em maior número.</a:t>
+          <a:bodyPr/>
+          <a:lstStyle/>
+          <a:p>
+            <a:r>
+              <a:rPr lang="pt-PT" dirty="0"/>
+              <a:t>Desta forma, estamos a maximizar o número de encomendas entregues enquanto mantemos o tempo médio de entrega o mínimo possível.</a:t>
             </a:r>
           </a:p>
         </p:txBody>
@@ -4116,7 +4084,7 @@
     </p:spTree>
     <p:extLst>
       <p:ext uri="{BB962C8B-B14F-4D97-AF65-F5344CB8AC3E}">
-        <p14:creationId xmlns:p14="http://schemas.microsoft.com/office/powerpoint/2010/main" val="913959966"/>
+        <p14:creationId xmlns:p14="http://schemas.microsoft.com/office/powerpoint/2010/main" val="4137157775"/>
       </p:ext>
     </p:extLst>
   </p:cSld>
@@ -4148,6 +4116,139 @@
           <p:cNvPr id="2" name="Título 1">
             <a:extLst>
               <a:ext uri="{FF2B5EF4-FFF2-40B4-BE49-F238E27FC236}">
+                <a16:creationId xmlns:a16="http://schemas.microsoft.com/office/drawing/2014/main" id="{60B5EF03-1172-4466-9B55-CDEAFC811BA5}"/>
+              </a:ext>
+            </a:extLst>
+          </p:cNvPr>
+          <p:cNvSpPr>
+            <a:spLocks noGrp="1"/>
+          </p:cNvSpPr>
+          <p:nvPr>
+            <p:ph type="title"/>
+          </p:nvPr>
+        </p:nvSpPr>
+        <p:spPr/>
+        <p:txBody>
+          <a:bodyPr/>
+          <a:lstStyle/>
+          <a:p>
+            <a:r>
+              <a:rPr lang="pt-PT" dirty="0"/>
+              <a:t>Solução algorítmica em destaque</a:t>
+            </a:r>
+          </a:p>
+        </p:txBody>
+      </p:sp>
+      <p:sp>
+        <p:nvSpPr>
+          <p:cNvPr id="3" name="Marcador de Posição de Conteúdo 2">
+            <a:extLst>
+              <a:ext uri="{FF2B5EF4-FFF2-40B4-BE49-F238E27FC236}">
+                <a16:creationId xmlns:a16="http://schemas.microsoft.com/office/drawing/2014/main" id="{8281AF53-B423-4602-ADDC-773ADF36EDDB}"/>
+              </a:ext>
+            </a:extLst>
+          </p:cNvPr>
+          <p:cNvSpPr>
+            <a:spLocks noGrp="1"/>
+          </p:cNvSpPr>
+          <p:nvPr>
+            <p:ph idx="1"/>
+          </p:nvPr>
+        </p:nvSpPr>
+        <p:spPr/>
+        <p:txBody>
+          <a:bodyPr>
+            <a:normAutofit/>
+          </a:bodyPr>
+          <a:lstStyle/>
+          <a:p>
+            <a:r>
+              <a:rPr lang="pt-PT" dirty="0"/>
+              <a:t>A solução mais trivial para atribuir encomendas a estafetas seria fazer dois for </a:t>
+            </a:r>
+            <a:r>
+              <a:rPr lang="pt-PT" dirty="0" err="1"/>
+              <a:t>loops</a:t>
+            </a:r>
+            <a:r>
+              <a:rPr lang="pt-PT" dirty="0"/>
+              <a:t>, um que percorre os estafetas e outro que percorre as encomendas, o que se traduziria em complexidade temporal O(V * E).</a:t>
+            </a:r>
+          </a:p>
+          <a:p>
+            <a:r>
+              <a:rPr lang="pt-PT" dirty="0"/>
+              <a:t>Com o nosso algoritmo, conseguimos complexidade temporal de  </a:t>
+            </a:r>
+          </a:p>
+          <a:p>
+            <a:pPr marL="0" indent="0">
+              <a:buNone/>
+            </a:pPr>
+            <a:r>
+              <a:rPr lang="pt-PT" dirty="0"/>
+              <a:t>O(V + E) num </a:t>
+            </a:r>
+            <a:r>
+              <a:rPr lang="pt-PT" dirty="0" err="1"/>
+              <a:t>while</a:t>
+            </a:r>
+            <a:r>
+              <a:rPr lang="pt-PT" dirty="0"/>
+              <a:t> </a:t>
+            </a:r>
+            <a:r>
+              <a:rPr lang="pt-PT" dirty="0" err="1"/>
+              <a:t>loop</a:t>
+            </a:r>
+            <a:r>
+              <a:rPr lang="pt-PT" dirty="0"/>
+              <a:t>.</a:t>
+            </a:r>
+          </a:p>
+          <a:p>
+            <a:r>
+              <a:rPr lang="pt-PT" dirty="0"/>
+              <a:t>Esta última operação é especialmente dominada pelas encomendas, que normalmente se encontram em maior número.</a:t>
+            </a:r>
+          </a:p>
+        </p:txBody>
+      </p:sp>
+    </p:spTree>
+    <p:extLst>
+      <p:ext uri="{BB962C8B-B14F-4D97-AF65-F5344CB8AC3E}">
+        <p14:creationId xmlns:p14="http://schemas.microsoft.com/office/powerpoint/2010/main" val="913959966"/>
+      </p:ext>
+    </p:extLst>
+  </p:cSld>
+  <p:clrMapOvr>
+    <a:masterClrMapping/>
+  </p:clrMapOvr>
+</p:sld>
+</file>
+
+<file path=ppt/slides/slide17.xml><?xml version="1.0" encoding="utf-8"?>
+<p:sld xmlns:a="http://schemas.openxmlformats.org/drawingml/2006/main" xmlns:r="http://schemas.openxmlformats.org/officeDocument/2006/relationships" xmlns:p="http://schemas.openxmlformats.org/presentationml/2006/main">
+  <p:cSld>
+    <p:spTree>
+      <p:nvGrpSpPr>
+        <p:cNvPr id="1" name=""/>
+        <p:cNvGrpSpPr/>
+        <p:nvPr/>
+      </p:nvGrpSpPr>
+      <p:grpSpPr>
+        <a:xfrm>
+          <a:off x="0" y="0"/>
+          <a:ext cx="0" cy="0"/>
+          <a:chOff x="0" y="0"/>
+          <a:chExt cx="0" cy="0"/>
+        </a:xfrm>
+      </p:grpSpPr>
+      <p:sp>
+        <p:nvSpPr>
+          <p:cNvPr id="2" name="Título 1">
+            <a:extLst>
+              <a:ext uri="{FF2B5EF4-FFF2-40B4-BE49-F238E27FC236}">
                 <a16:creationId xmlns:a16="http://schemas.microsoft.com/office/drawing/2014/main" id="{B0CEF475-72A7-4C38-81AD-F569E4301135}"/>
               </a:ext>
             </a:extLst>
@@ -4199,7 +4300,7 @@
           <a:p>
             <a:r>
               <a:rPr lang="pt-PT" dirty="0"/>
-              <a:t>Conseguir traduzir algoritmos para código em C.</a:t>
+              <a:t>Conseguir traduzir algoritmos para código em C++.</a:t>
             </a:r>
           </a:p>
         </p:txBody>
@@ -4672,7 +4773,7 @@
         <p:spPr/>
         <p:txBody>
           <a:bodyPr>
-            <a:normAutofit fontScale="92500" lnSpcReduction="10000"/>
+            <a:normAutofit fontScale="85000" lnSpcReduction="20000"/>
           </a:bodyPr>
           <a:lstStyle/>
           <a:p>
@@ -4696,6 +4797,28 @@
             <a:r>
               <a:rPr lang="pt-PT" dirty="0"/>
               <a:t>e – número de encomendas entregues</a:t>
+            </a:r>
+          </a:p>
+          <a:p>
+            <a:pPr lvl="1"/>
+            <a:r>
+              <a:rPr lang="pt-PT" dirty="0" err="1"/>
+              <a:t>pvmax</a:t>
+            </a:r>
+            <a:r>
+              <a:rPr lang="pt-PT" dirty="0"/>
+              <a:t> – peso máximo que o estafeta pode transportar</a:t>
+            </a:r>
+          </a:p>
+          <a:p>
+            <a:pPr lvl="1"/>
+            <a:r>
+              <a:rPr lang="pt-PT" dirty="0" err="1"/>
+              <a:t>vvmax</a:t>
+            </a:r>
+            <a:r>
+              <a:rPr lang="pt-PT" dirty="0"/>
+              <a:t> – volume máximo que o estafeta pode transportar</a:t>
             </a:r>
           </a:p>
           <a:p>
@@ -4828,7 +4951,7 @@
           <p:cNvPr id="2" name="Título 1">
             <a:extLst>
               <a:ext uri="{FF2B5EF4-FFF2-40B4-BE49-F238E27FC236}">
-                <a16:creationId xmlns:a16="http://schemas.microsoft.com/office/drawing/2014/main" id="{ADDDF31B-7C36-4052-A8DB-A41E32426F4B}"/>
+                <a16:creationId xmlns:a16="http://schemas.microsoft.com/office/drawing/2014/main" id="{484ED4EC-A41A-4B0D-8DD9-9004D67AADCD}"/>
               </a:ext>
             </a:extLst>
           </p:cNvPr>
@@ -4846,82 +4969,1023 @@
           <a:p>
             <a:r>
               <a:rPr lang="pt-PT" dirty="0"/>
-              <a:t>Cenário 1 – Algoritmos relevantes</a:t>
-            </a:r>
-          </a:p>
-        </p:txBody>
-      </p:sp>
-      <p:sp>
-        <p:nvSpPr>
-          <p:cNvPr id="3" name="Marcador de Posição de Conteúdo 2">
-            <a:extLst>
-              <a:ext uri="{FF2B5EF4-FFF2-40B4-BE49-F238E27FC236}">
-                <a16:creationId xmlns:a16="http://schemas.microsoft.com/office/drawing/2014/main" id="{9467406C-A16F-4E5B-8CA9-2192D2CDADF3}"/>
-              </a:ext>
-            </a:extLst>
-          </p:cNvPr>
-          <p:cNvSpPr>
-            <a:spLocks noGrp="1"/>
-          </p:cNvSpPr>
-          <p:nvPr>
-            <p:ph idx="1"/>
-          </p:nvPr>
-        </p:nvSpPr>
-        <p:spPr/>
-        <p:txBody>
-          <a:bodyPr>
-            <a:normAutofit fontScale="92500" lnSpcReduction="10000"/>
+              <a:t>Cenário 1 - Formalização</a:t>
+            </a:r>
+          </a:p>
+        </p:txBody>
+      </p:sp>
+      <mc:AlternateContent xmlns:mc="http://schemas.openxmlformats.org/markup-compatibility/2006">
+        <mc:Choice xmlns:a14="http://schemas.microsoft.com/office/drawing/2010/main" Requires="a14">
+          <p:sp>
+            <p:nvSpPr>
+              <p:cNvPr id="3" name="Marcador de Posição de Conteúdo 2">
+                <a:extLst>
+                  <a:ext uri="{FF2B5EF4-FFF2-40B4-BE49-F238E27FC236}">
+                    <a16:creationId xmlns:a16="http://schemas.microsoft.com/office/drawing/2014/main" id="{AB83EF2E-9797-4F26-9601-62E9C9618B0C}"/>
+                  </a:ext>
+                </a:extLst>
+              </p:cNvPr>
+              <p:cNvSpPr>
+                <a:spLocks noGrp="1"/>
+              </p:cNvSpPr>
+              <p:nvPr>
+                <p:ph idx="1"/>
+              </p:nvPr>
+            </p:nvSpPr>
+            <p:spPr>
+              <a:xfrm>
+                <a:off x="838200" y="1476375"/>
+                <a:ext cx="10515600" cy="4700588"/>
+              </a:xfrm>
+            </p:spPr>
+            <p:txBody>
+              <a:bodyPr>
+                <a:normAutofit/>
+              </a:bodyPr>
+              <a:lstStyle/>
+              <a:p>
+                <a:r>
+                  <a:rPr lang="pt-PT" dirty="0"/>
+                  <a:t>Maximizar </a:t>
+                </a:r>
+                <a14:m>
+                  <m:oMath xmlns:m="http://schemas.openxmlformats.org/officeDocument/2006/math">
+                    <m:nary>
+                      <m:naryPr>
+                        <m:chr m:val="∑"/>
+                        <m:limLoc m:val="undOvr"/>
+                        <m:grow m:val="on"/>
+                        <m:ctrlPr>
+                          <a:rPr lang="pt-PT" i="1" smtClean="0">
+                            <a:latin typeface="Cambria Math" panose="02040503050406030204" pitchFamily="18" charset="0"/>
+                          </a:rPr>
+                        </m:ctrlPr>
+                      </m:naryPr>
+                      <m:sub>
+                        <m:r>
+                          <a:rPr lang="pt-PT" i="1">
+                            <a:latin typeface="Cambria Math" panose="02040503050406030204" pitchFamily="18" charset="0"/>
+                          </a:rPr>
+                          <m:t>𝑖</m:t>
+                        </m:r>
+                        <m:r>
+                          <a:rPr lang="pt-PT" i="0">
+                            <a:latin typeface="Cambria Math" panose="02040503050406030204" pitchFamily="18" charset="0"/>
+                          </a:rPr>
+                          <m:t>=1</m:t>
+                        </m:r>
+                      </m:sub>
+                      <m:sup>
+                        <m:r>
+                          <a:rPr lang="pt-PT" i="1">
+                            <a:latin typeface="Cambria Math" panose="02040503050406030204" pitchFamily="18" charset="0"/>
+                          </a:rPr>
+                          <m:t>𝑛</m:t>
+                        </m:r>
+                      </m:sup>
+                      <m:e>
+                        <m:r>
+                          <a:rPr lang="pt-PT" b="0" i="1" smtClean="0">
+                            <a:latin typeface="Cambria Math" panose="02040503050406030204" pitchFamily="18" charset="0"/>
+                          </a:rPr>
+                          <m:t>𝑋</m:t>
+                        </m:r>
+                        <m:r>
+                          <a:rPr lang="pt-PT" b="0" i="1" baseline="-25000" smtClean="0">
+                            <a:latin typeface="Cambria Math" panose="02040503050406030204" pitchFamily="18" charset="0"/>
+                          </a:rPr>
+                          <m:t>𝑖</m:t>
+                        </m:r>
+                      </m:e>
+                    </m:nary>
+                  </m:oMath>
+                </a14:m>
+                <a:r>
+                  <a:rPr lang="pt-PT" dirty="0"/>
+                  <a:t>, em que X</a:t>
+                </a:r>
+                <a:r>
+                  <a:rPr lang="pt-PT" baseline="-25000" dirty="0"/>
+                  <a:t>i</a:t>
+                </a:r>
+                <a:r>
+                  <a:rPr lang="pt-PT" dirty="0"/>
+                  <a:t> é 1  se a encomenda i foi entregue, senão 0.</a:t>
+                </a:r>
+              </a:p>
+              <a:p>
+                <a:r>
+                  <a:rPr lang="pt-PT" dirty="0"/>
+                  <a:t>Minimizar </a:t>
+                </a:r>
+                <a14:m>
+                  <m:oMath xmlns:m="http://schemas.openxmlformats.org/officeDocument/2006/math">
+                    <m:nary>
+                      <m:naryPr>
+                        <m:chr m:val="∑"/>
+                        <m:limLoc m:val="undOvr"/>
+                        <m:grow m:val="on"/>
+                        <m:ctrlPr>
+                          <a:rPr lang="pt-PT" i="1" dirty="0" smtClean="0">
+                            <a:latin typeface="Cambria Math" panose="02040503050406030204" pitchFamily="18" charset="0"/>
+                          </a:rPr>
+                        </m:ctrlPr>
+                      </m:naryPr>
+                      <m:sub>
+                        <m:r>
+                          <a:rPr lang="pt-PT" i="1" dirty="0">
+                            <a:latin typeface="Cambria Math" panose="02040503050406030204" pitchFamily="18" charset="0"/>
+                          </a:rPr>
+                          <m:t>𝑖</m:t>
+                        </m:r>
+                        <m:r>
+                          <a:rPr lang="pt-PT" i="0" dirty="0">
+                            <a:latin typeface="Cambria Math" panose="02040503050406030204" pitchFamily="18" charset="0"/>
+                          </a:rPr>
+                          <m:t>=1</m:t>
+                        </m:r>
+                      </m:sub>
+                      <m:sup>
+                        <m:r>
+                          <a:rPr lang="pt-PT" b="0" i="1" dirty="0" smtClean="0">
+                            <a:latin typeface="Cambria Math" panose="02040503050406030204" pitchFamily="18" charset="0"/>
+                          </a:rPr>
+                          <m:t>𝑛</m:t>
+                        </m:r>
+                      </m:sup>
+                      <m:e>
+                        <m:r>
+                          <a:rPr lang="pt-PT" b="0" i="1" dirty="0" smtClean="0">
+                            <a:latin typeface="Cambria Math" panose="02040503050406030204" pitchFamily="18" charset="0"/>
+                          </a:rPr>
+                          <m:t>𝑌</m:t>
+                        </m:r>
+                        <m:r>
+                          <a:rPr lang="pt-PT" b="0" i="1" baseline="-25000" dirty="0" smtClean="0">
+                            <a:latin typeface="Cambria Math" panose="02040503050406030204" pitchFamily="18" charset="0"/>
+                          </a:rPr>
+                          <m:t>𝑖</m:t>
+                        </m:r>
+                      </m:e>
+                    </m:nary>
+                  </m:oMath>
+                </a14:m>
+                <a:r>
+                  <a:rPr lang="pt-PT" dirty="0"/>
+                  <a:t>, em que </a:t>
+                </a:r>
+                <a:r>
+                  <a:rPr lang="pt-PT" dirty="0" err="1"/>
+                  <a:t>Y</a:t>
+                </a:r>
+                <a:r>
+                  <a:rPr lang="pt-PT" baseline="-25000" dirty="0" err="1"/>
+                  <a:t>i</a:t>
+                </a:r>
+                <a:r>
+                  <a:rPr lang="pt-PT" dirty="0"/>
+                  <a:t> é 1 se o estafeta i foi usado, senão 0.</a:t>
+                </a:r>
+              </a:p>
+              <a:p>
+                <a:r>
+                  <a:rPr lang="pt-PT" dirty="0"/>
+                  <a:t>Sujeito a:</a:t>
+                </a:r>
+              </a:p>
+              <a:p>
+                <a:pPr marL="0" indent="0">
+                  <a:buNone/>
+                </a:pPr>
+                <a:endParaRPr lang="pt-PT" dirty="0"/>
+              </a:p>
+              <a:p>
+                <a:pPr marL="0" indent="0">
+                  <a:buNone/>
+                </a:pPr>
+                <a:endParaRPr lang="pt-PT" dirty="0"/>
+              </a:p>
+              <a:p>
+                <a:pPr marL="0" indent="0">
+                  <a:buNone/>
+                </a:pPr>
+                <a:r>
+                  <a:rPr lang="pt-PT" dirty="0"/>
+                  <a:t>	</a:t>
+                </a:r>
+              </a:p>
+              <a:p>
+                <a:pPr marL="0" indent="0">
+                  <a:buNone/>
+                </a:pPr>
+                <a:r>
+                  <a:rPr lang="pt-PT" dirty="0">
+                    <a:solidFill>
+                      <a:schemeClr val="tx1"/>
+                    </a:solidFill>
+                  </a:rPr>
+                  <a:t> </a:t>
+                </a:r>
+              </a:p>
+            </p:txBody>
+          </p:sp>
+        </mc:Choice>
+        <mc:Fallback>
+          <p:sp>
+            <p:nvSpPr>
+              <p:cNvPr id="3" name="Marcador de Posição de Conteúdo 2">
+                <a:extLst>
+                  <a:ext uri="{FF2B5EF4-FFF2-40B4-BE49-F238E27FC236}">
+                    <a16:creationId xmlns:a16="http://schemas.microsoft.com/office/drawing/2014/main" id="{AB83EF2E-9797-4F26-9601-62E9C9618B0C}"/>
+                  </a:ext>
+                </a:extLst>
+              </p:cNvPr>
+              <p:cNvSpPr>
+                <a:spLocks noGrp="1" noRot="1" noChangeAspect="1" noMove="1" noResize="1" noEditPoints="1" noAdjustHandles="1" noChangeArrowheads="1" noChangeShapeType="1" noTextEdit="1"/>
+              </p:cNvSpPr>
+              <p:nvPr>
+                <p:ph idx="1"/>
+              </p:nvPr>
+            </p:nvSpPr>
+            <p:spPr>
+              <a:xfrm>
+                <a:off x="838200" y="1476375"/>
+                <a:ext cx="10515600" cy="4700588"/>
+              </a:xfrm>
+              <a:blipFill>
+                <a:blip r:embed="rId2"/>
+                <a:stretch>
+                  <a:fillRect l="-1043" t="-2075"/>
+                </a:stretch>
+              </a:blipFill>
+            </p:spPr>
+            <p:txBody>
+              <a:bodyPr/>
+              <a:lstStyle/>
+              <a:p>
+                <a:r>
+                  <a:rPr lang="pt-PT">
+                    <a:noFill/>
+                  </a:rPr>
+                  <a:t> </a:t>
+                </a:r>
+              </a:p>
+            </p:txBody>
+          </p:sp>
+        </mc:Fallback>
+      </mc:AlternateContent>
+      <mc:AlternateContent xmlns:mc="http://schemas.openxmlformats.org/markup-compatibility/2006">
+        <mc:Choice xmlns:a14="http://schemas.microsoft.com/office/drawing/2010/main" Requires="a14">
+          <p:sp>
+            <p:nvSpPr>
+              <p:cNvPr id="4" name="CaixaDeTexto 3">
+                <a:extLst>
+                  <a:ext uri="{FF2B5EF4-FFF2-40B4-BE49-F238E27FC236}">
+                    <a16:creationId xmlns:a16="http://schemas.microsoft.com/office/drawing/2014/main" id="{8DF507FA-16F2-49C7-83E2-F5B4AE4274E0}"/>
+                  </a:ext>
+                </a:extLst>
+              </p:cNvPr>
+              <p:cNvSpPr txBox="1"/>
+              <p:nvPr/>
+            </p:nvSpPr>
+            <p:spPr>
+              <a:xfrm>
+                <a:off x="542924" y="3648075"/>
+                <a:ext cx="2943226" cy="2295308"/>
+              </a:xfrm>
+              <a:prstGeom prst="rect">
+                <a:avLst/>
+              </a:prstGeom>
+              <a:noFill/>
+            </p:spPr>
+            <p:txBody>
+              <a:bodyPr wrap="square" lIns="0" tIns="0" rIns="0" bIns="0" rtlCol="0">
+                <a:spAutoFit/>
+              </a:bodyPr>
+              <a:lstStyle/>
+              <a:p>
+                <a14:m>
+                  <m:oMathPara xmlns:m="http://schemas.openxmlformats.org/officeDocument/2006/math">
+                    <m:oMathParaPr>
+                      <m:jc m:val="centerGroup"/>
+                    </m:oMathParaPr>
+                    <m:oMath xmlns:m="http://schemas.openxmlformats.org/officeDocument/2006/math">
+                      <m:d>
+                        <m:dPr>
+                          <m:begChr m:val="{"/>
+                          <m:endChr m:val=""/>
+                          <m:ctrlPr>
+                            <a:rPr lang="pt-PT" dirty="0" smtClean="0">
+                              <a:solidFill>
+                                <a:schemeClr val="tx1"/>
+                              </a:solidFill>
+                              <a:latin typeface="Cambria Math" panose="02040503050406030204" pitchFamily="18" charset="0"/>
+                            </a:rPr>
+                          </m:ctrlPr>
+                        </m:dPr>
+                        <m:e>
+                          <m:m>
+                            <m:mPr>
+                              <m:plcHide m:val="on"/>
+                              <m:mcs>
+                                <m:mc>
+                                  <m:mcPr>
+                                    <m:count m:val="1"/>
+                                    <m:mcJc m:val="center"/>
+                                  </m:mcPr>
+                                </m:mc>
+                              </m:mcs>
+                              <m:ctrlPr>
+                                <a:rPr lang="pt-PT" dirty="0">
+                                  <a:solidFill>
+                                    <a:schemeClr val="tx1"/>
+                                  </a:solidFill>
+                                  <a:latin typeface="Cambria Math" panose="02040503050406030204" pitchFamily="18" charset="0"/>
+                                </a:rPr>
+                              </m:ctrlPr>
+                            </m:mPr>
+                            <m:mr>
+                              <m:e>
+                                <m:nary>
+                                  <m:naryPr>
+                                    <m:chr m:val="∑"/>
+                                    <m:limLoc m:val="undOvr"/>
+                                    <m:grow m:val="on"/>
+                                    <m:ctrlPr>
+                                      <a:rPr lang="pt-PT" i="1" dirty="0" smtClean="0">
+                                        <a:solidFill>
+                                          <a:schemeClr val="tx1"/>
+                                        </a:solidFill>
+                                        <a:latin typeface="Cambria Math" panose="02040503050406030204" pitchFamily="18" charset="0"/>
+                                      </a:rPr>
+                                    </m:ctrlPr>
+                                  </m:naryPr>
+                                  <m:sub>
+                                    <m:r>
+                                      <a:rPr lang="pt-PT" i="1" dirty="0">
+                                        <a:solidFill>
+                                          <a:schemeClr val="tx1"/>
+                                        </a:solidFill>
+                                        <a:latin typeface="Cambria Math" panose="02040503050406030204" pitchFamily="18" charset="0"/>
+                                      </a:rPr>
+                                      <m:t>𝑖</m:t>
+                                    </m:r>
+                                    <m:r>
+                                      <a:rPr lang="pt-PT" i="1" dirty="0">
+                                        <a:solidFill>
+                                          <a:schemeClr val="tx1"/>
+                                        </a:solidFill>
+                                        <a:latin typeface="Cambria Math" panose="02040503050406030204" pitchFamily="18" charset="0"/>
+                                      </a:rPr>
+                                      <m:t>=1</m:t>
+                                    </m:r>
+                                  </m:sub>
+                                  <m:sup>
+                                    <m:r>
+                                      <a:rPr lang="pt-PT" i="1" dirty="0">
+                                        <a:solidFill>
+                                          <a:schemeClr val="tx1"/>
+                                        </a:solidFill>
+                                        <a:latin typeface="Cambria Math" panose="02040503050406030204" pitchFamily="18" charset="0"/>
+                                      </a:rPr>
+                                      <m:t>𝑛</m:t>
+                                    </m:r>
+                                  </m:sup>
+                                  <m:e>
+                                    <m:r>
+                                      <a:rPr lang="pt-PT" i="1" dirty="0">
+                                        <a:solidFill>
+                                          <a:schemeClr val="tx1"/>
+                                        </a:solidFill>
+                                        <a:latin typeface="Cambria Math" panose="02040503050406030204" pitchFamily="18" charset="0"/>
+                                      </a:rPr>
+                                      <m:t>𝜌</m:t>
+                                    </m:r>
+                                    <m:r>
+                                      <a:rPr lang="pt-PT" dirty="0">
+                                        <a:solidFill>
+                                          <a:schemeClr val="tx1"/>
+                                        </a:solidFill>
+                                        <a:latin typeface="Cambria Math" panose="02040503050406030204" pitchFamily="18" charset="0"/>
+                                      </a:rPr>
+                                      <m:t>ⅈ⋅</m:t>
+                                    </m:r>
+                                    <m:sSub>
+                                      <m:sSubPr>
+                                        <m:ctrlPr>
+                                          <a:rPr lang="pt-PT" i="1" dirty="0">
+                                            <a:solidFill>
+                                              <a:schemeClr val="tx1"/>
+                                            </a:solidFill>
+                                            <a:latin typeface="Cambria Math" panose="02040503050406030204" pitchFamily="18" charset="0"/>
+                                          </a:rPr>
+                                        </m:ctrlPr>
+                                      </m:sSubPr>
+                                      <m:e>
+                                        <m:r>
+                                          <a:rPr lang="pt-PT" i="1" dirty="0">
+                                            <a:solidFill>
+                                              <a:schemeClr val="tx1"/>
+                                            </a:solidFill>
+                                            <a:latin typeface="Cambria Math" panose="02040503050406030204" pitchFamily="18" charset="0"/>
+                                          </a:rPr>
+                                          <m:t>𝑧</m:t>
+                                        </m:r>
+                                      </m:e>
+                                      <m:sub>
+                                        <m:r>
+                                          <a:rPr lang="pt-PT" i="1" dirty="0">
+                                            <a:solidFill>
+                                              <a:schemeClr val="tx1"/>
+                                            </a:solidFill>
+                                            <a:latin typeface="Cambria Math" panose="02040503050406030204" pitchFamily="18" charset="0"/>
+                                          </a:rPr>
+                                          <m:t>𝑗𝑖</m:t>
+                                        </m:r>
+                                      </m:sub>
+                                    </m:sSub>
+                                  </m:e>
+                                </m:nary>
+                                <m:r>
+                                  <a:rPr lang="pt-PT" i="0" dirty="0">
+                                    <a:solidFill>
+                                      <a:schemeClr val="tx1"/>
+                                    </a:solidFill>
+                                    <a:latin typeface="Cambria Math" panose="02040503050406030204" pitchFamily="18" charset="0"/>
+                                  </a:rPr>
+                                  <m:t>≤</m:t>
+                                </m:r>
+                                <m:sSub>
+                                  <m:sSubPr>
+                                    <m:ctrlPr>
+                                      <a:rPr lang="pt-PT" i="1" dirty="0">
+                                        <a:solidFill>
+                                          <a:schemeClr val="tx1"/>
+                                        </a:solidFill>
+                                        <a:latin typeface="Cambria Math" panose="02040503050406030204" pitchFamily="18" charset="0"/>
+                                      </a:rPr>
+                                    </m:ctrlPr>
+                                  </m:sSubPr>
+                                  <m:e>
+                                    <m:r>
+                                      <a:rPr lang="pt-PT" b="0" i="1" dirty="0" smtClean="0">
+                                        <a:solidFill>
+                                          <a:schemeClr val="tx1"/>
+                                        </a:solidFill>
+                                        <a:latin typeface="Cambria Math" panose="02040503050406030204" pitchFamily="18" charset="0"/>
+                                      </a:rPr>
+                                      <m:t>𝑃</m:t>
+                                    </m:r>
+                                  </m:e>
+                                  <m:sub>
+                                    <m:r>
+                                      <a:rPr lang="pt-PT" i="1" dirty="0">
+                                        <a:solidFill>
+                                          <a:schemeClr val="tx1"/>
+                                        </a:solidFill>
+                                        <a:latin typeface="Cambria Math" panose="02040503050406030204" pitchFamily="18" charset="0"/>
+                                      </a:rPr>
+                                      <m:t>𝑗</m:t>
+                                    </m:r>
+                                  </m:sub>
+                                </m:sSub>
+                              </m:e>
+                            </m:mr>
+                            <m:mr>
+                              <m:e>
+                                <m:eqArr>
+                                  <m:eqArrPr>
+                                    <m:ctrlPr>
+                                      <a:rPr lang="pt-PT" i="1" dirty="0">
+                                        <a:solidFill>
+                                          <a:schemeClr val="tx1"/>
+                                        </a:solidFill>
+                                        <a:latin typeface="Cambria Math" panose="02040503050406030204" pitchFamily="18" charset="0"/>
+                                      </a:rPr>
+                                    </m:ctrlPr>
+                                  </m:eqArrPr>
+                                  <m:e>
+                                    <m:nary>
+                                      <m:naryPr>
+                                        <m:chr m:val="∑"/>
+                                        <m:limLoc m:val="undOvr"/>
+                                        <m:grow m:val="on"/>
+                                        <m:ctrlPr>
+                                          <a:rPr lang="pt-PT" i="1" dirty="0" smtClean="0">
+                                            <a:solidFill>
+                                              <a:schemeClr val="tx1"/>
+                                            </a:solidFill>
+                                            <a:latin typeface="Cambria Math" panose="02040503050406030204" pitchFamily="18" charset="0"/>
+                                          </a:rPr>
+                                        </m:ctrlPr>
+                                      </m:naryPr>
+                                      <m:sub>
+                                        <m:r>
+                                          <a:rPr lang="pt-PT" i="1" dirty="0">
+                                            <a:solidFill>
+                                              <a:schemeClr val="tx1"/>
+                                            </a:solidFill>
+                                            <a:latin typeface="Cambria Math" panose="02040503050406030204" pitchFamily="18" charset="0"/>
+                                          </a:rPr>
+                                          <m:t>𝑖</m:t>
+                                        </m:r>
+                                        <m:r>
+                                          <a:rPr lang="pt-PT" i="1" dirty="0">
+                                            <a:solidFill>
+                                              <a:schemeClr val="tx1"/>
+                                            </a:solidFill>
+                                            <a:latin typeface="Cambria Math" panose="02040503050406030204" pitchFamily="18" charset="0"/>
+                                          </a:rPr>
+                                          <m:t>=1</m:t>
+                                        </m:r>
+                                      </m:sub>
+                                      <m:sup>
+                                        <m:r>
+                                          <a:rPr lang="pt-PT" i="1" dirty="0" smtClean="0">
+                                            <a:solidFill>
+                                              <a:schemeClr val="tx1"/>
+                                            </a:solidFill>
+                                            <a:latin typeface="Cambria Math" panose="02040503050406030204" pitchFamily="18" charset="0"/>
+                                          </a:rPr>
+                                          <m:t>𝑛</m:t>
+                                        </m:r>
+                                      </m:sup>
+                                      <m:e>
+                                        <m:sSub>
+                                          <m:sSubPr>
+                                            <m:ctrlPr>
+                                              <a:rPr lang="pt-PT" i="1" dirty="0">
+                                                <a:solidFill>
+                                                  <a:schemeClr val="tx1"/>
+                                                </a:solidFill>
+                                                <a:latin typeface="Cambria Math" panose="02040503050406030204" pitchFamily="18" charset="0"/>
+                                              </a:rPr>
+                                            </m:ctrlPr>
+                                          </m:sSubPr>
+                                          <m:e>
+                                            <m:r>
+                                              <a:rPr lang="pt-PT" i="1" dirty="0">
+                                                <a:solidFill>
+                                                  <a:schemeClr val="tx1"/>
+                                                </a:solidFill>
+                                                <a:latin typeface="Cambria Math" panose="02040503050406030204" pitchFamily="18" charset="0"/>
+                                              </a:rPr>
+                                              <m:t>𝑣</m:t>
+                                            </m:r>
+                                          </m:e>
+                                          <m:sub>
+                                            <m:r>
+                                              <a:rPr lang="pt-PT" i="1" dirty="0">
+                                                <a:solidFill>
+                                                  <a:schemeClr val="tx1"/>
+                                                </a:solidFill>
+                                                <a:latin typeface="Cambria Math" panose="02040503050406030204" pitchFamily="18" charset="0"/>
+                                              </a:rPr>
+                                              <m:t>𝑖</m:t>
+                                            </m:r>
+                                          </m:sub>
+                                        </m:sSub>
+                                        <m:r>
+                                          <a:rPr lang="pt-PT" dirty="0">
+                                            <a:solidFill>
+                                              <a:schemeClr val="tx1"/>
+                                            </a:solidFill>
+                                            <a:latin typeface="Cambria Math" panose="02040503050406030204" pitchFamily="18" charset="0"/>
+                                          </a:rPr>
+                                          <m:t>⋅</m:t>
+                                        </m:r>
+                                        <m:sSub>
+                                          <m:sSubPr>
+                                            <m:ctrlPr>
+                                              <a:rPr lang="pt-PT" i="1" dirty="0">
+                                                <a:solidFill>
+                                                  <a:schemeClr val="tx1"/>
+                                                </a:solidFill>
+                                                <a:latin typeface="Cambria Math" panose="02040503050406030204" pitchFamily="18" charset="0"/>
+                                              </a:rPr>
+                                            </m:ctrlPr>
+                                          </m:sSubPr>
+                                          <m:e>
+                                            <m:r>
+                                              <a:rPr lang="pt-PT" i="1" dirty="0">
+                                                <a:solidFill>
+                                                  <a:schemeClr val="tx1"/>
+                                                </a:solidFill>
+                                                <a:latin typeface="Cambria Math" panose="02040503050406030204" pitchFamily="18" charset="0"/>
+                                              </a:rPr>
+                                              <m:t>𝑧</m:t>
+                                            </m:r>
+                                          </m:e>
+                                          <m:sub>
+                                            <m:r>
+                                              <a:rPr lang="pt-PT" i="1" dirty="0">
+                                                <a:solidFill>
+                                                  <a:schemeClr val="tx1"/>
+                                                </a:solidFill>
+                                                <a:latin typeface="Cambria Math" panose="02040503050406030204" pitchFamily="18" charset="0"/>
+                                              </a:rPr>
+                                              <m:t>𝑗</m:t>
+                                            </m:r>
+                                            <m:r>
+                                              <a:rPr lang="pt-PT" i="1" dirty="0">
+                                                <a:solidFill>
+                                                  <a:schemeClr val="tx1"/>
+                                                </a:solidFill>
+                                                <a:latin typeface="Cambria Math" panose="02040503050406030204" pitchFamily="18" charset="0"/>
+                                              </a:rPr>
+                                              <m:t>𝑖</m:t>
+                                            </m:r>
+                                          </m:sub>
+                                        </m:sSub>
+                                      </m:e>
+                                    </m:nary>
+                                    <m:r>
+                                      <a:rPr lang="pt-PT" b="0" i="1" dirty="0" smtClean="0">
+                                        <a:solidFill>
+                                          <a:schemeClr val="tx1"/>
+                                        </a:solidFill>
+                                        <a:latin typeface="Cambria Math" panose="02040503050406030204" pitchFamily="18" charset="0"/>
+                                      </a:rPr>
+                                      <m:t>≤</m:t>
+                                    </m:r>
+                                    <m:sSub>
+                                      <m:sSubPr>
+                                        <m:ctrlPr>
+                                          <a:rPr lang="pt-PT" i="1" dirty="0">
+                                            <a:solidFill>
+                                              <a:schemeClr val="tx1"/>
+                                            </a:solidFill>
+                                            <a:latin typeface="Cambria Math" panose="02040503050406030204" pitchFamily="18" charset="0"/>
+                                          </a:rPr>
+                                        </m:ctrlPr>
+                                      </m:sSubPr>
+                                      <m:e>
+                                        <m:r>
+                                          <a:rPr lang="pt-PT" i="1" dirty="0">
+                                            <a:solidFill>
+                                              <a:schemeClr val="tx1"/>
+                                            </a:solidFill>
+                                            <a:latin typeface="Cambria Math" panose="02040503050406030204" pitchFamily="18" charset="0"/>
+                                          </a:rPr>
+                                          <m:t>𝑉</m:t>
+                                        </m:r>
+                                      </m:e>
+                                      <m:sub>
+                                        <m:r>
+                                          <a:rPr lang="pt-PT" i="1" dirty="0">
+                                            <a:solidFill>
+                                              <a:schemeClr val="tx1"/>
+                                            </a:solidFill>
+                                            <a:latin typeface="Cambria Math" panose="02040503050406030204" pitchFamily="18" charset="0"/>
+                                          </a:rPr>
+                                          <m:t>𝑗</m:t>
+                                        </m:r>
+                                      </m:sub>
+                                    </m:sSub>
+                                  </m:e>
+                                  <m:e>
+                                    <m:r>
+                                      <a:rPr lang="pt-PT" b="0" i="1" dirty="0" smtClean="0">
+                                        <a:solidFill>
+                                          <a:schemeClr val="tx1"/>
+                                        </a:solidFill>
+                                        <a:latin typeface="Cambria Math" panose="02040503050406030204" pitchFamily="18" charset="0"/>
+                                      </a:rPr>
+                                      <m:t>𝑝</m:t>
+                                    </m:r>
+                                    <m:r>
+                                      <a:rPr lang="pt-PT" b="0" i="1" baseline="-25000" dirty="0" smtClean="0">
+                                        <a:solidFill>
+                                          <a:schemeClr val="tx1"/>
+                                        </a:solidFill>
+                                        <a:latin typeface="Cambria Math" panose="02040503050406030204" pitchFamily="18" charset="0"/>
+                                      </a:rPr>
+                                      <m:t>𝑖</m:t>
+                                    </m:r>
+                                    <m:r>
+                                      <a:rPr lang="pt-PT" b="0" i="1" dirty="0" smtClean="0">
+                                        <a:solidFill>
+                                          <a:schemeClr val="tx1"/>
+                                        </a:solidFill>
+                                        <a:latin typeface="Cambria Math" panose="02040503050406030204" pitchFamily="18" charset="0"/>
+                                      </a:rPr>
+                                      <m:t>, </m:t>
+                                    </m:r>
+                                    <m:r>
+                                      <a:rPr lang="pt-PT" b="0" i="1" dirty="0" smtClean="0">
+                                        <a:solidFill>
+                                          <a:schemeClr val="tx1"/>
+                                        </a:solidFill>
+                                        <a:latin typeface="Cambria Math" panose="02040503050406030204" pitchFamily="18" charset="0"/>
+                                      </a:rPr>
+                                      <m:t>𝑣𝑖</m:t>
+                                    </m:r>
+                                    <m:r>
+                                      <a:rPr lang="pt-PT" b="0" i="1" dirty="0" smtClean="0">
+                                        <a:solidFill>
+                                          <a:schemeClr val="tx1"/>
+                                        </a:solidFill>
+                                        <a:latin typeface="Cambria Math" panose="02040503050406030204" pitchFamily="18" charset="0"/>
+                                      </a:rPr>
+                                      <m:t>, </m:t>
+                                    </m:r>
+                                    <m:r>
+                                      <a:rPr lang="pt-PT" b="0" i="1" dirty="0" smtClean="0">
+                                        <a:solidFill>
+                                          <a:schemeClr val="tx1"/>
+                                        </a:solidFill>
+                                        <a:latin typeface="Cambria Math" panose="02040503050406030204" pitchFamily="18" charset="0"/>
+                                      </a:rPr>
+                                      <m:t>𝑃𝑗</m:t>
+                                    </m:r>
+                                    <m:r>
+                                      <a:rPr lang="pt-PT" b="0" i="1" dirty="0" smtClean="0">
+                                        <a:solidFill>
+                                          <a:schemeClr val="tx1"/>
+                                        </a:solidFill>
+                                        <a:latin typeface="Cambria Math" panose="02040503050406030204" pitchFamily="18" charset="0"/>
+                                      </a:rPr>
+                                      <m:t>, </m:t>
+                                    </m:r>
+                                    <m:r>
+                                      <a:rPr lang="pt-PT" b="0" i="1" dirty="0" smtClean="0">
+                                        <a:solidFill>
+                                          <a:schemeClr val="tx1"/>
+                                        </a:solidFill>
+                                        <a:latin typeface="Cambria Math" panose="02040503050406030204" pitchFamily="18" charset="0"/>
+                                      </a:rPr>
+                                      <m:t>𝑉𝑗</m:t>
+                                    </m:r>
+                                    <m:r>
+                                      <a:rPr lang="pt-PT" b="0" i="1" dirty="0" smtClean="0">
+                                        <a:solidFill>
+                                          <a:schemeClr val="tx1"/>
+                                        </a:solidFill>
+                                        <a:latin typeface="Cambria Math" panose="02040503050406030204" pitchFamily="18" charset="0"/>
+                                      </a:rPr>
+                                      <m:t> </m:t>
+                                    </m:r>
+                                    <m:r>
+                                      <a:rPr lang="pt-PT" b="0" i="1" dirty="0" smtClean="0">
+                                        <a:solidFill>
+                                          <a:schemeClr val="tx1"/>
+                                        </a:solidFill>
+                                        <a:latin typeface="Cambria Math" panose="02040503050406030204" pitchFamily="18" charset="0"/>
+                                        <a:ea typeface="Cambria Math" panose="02040503050406030204" pitchFamily="18" charset="0"/>
+                                      </a:rPr>
+                                      <m:t>∈</m:t>
+                                    </m:r>
+                                    <m:r>
+                                      <a:rPr lang="pt-PT" b="0" i="1" dirty="0" smtClean="0">
+                                        <a:solidFill>
+                                          <a:schemeClr val="tx1"/>
+                                        </a:solidFill>
+                                        <a:latin typeface="Cambria Math" panose="02040503050406030204" pitchFamily="18" charset="0"/>
+                                        <a:ea typeface="Cambria Math" panose="02040503050406030204" pitchFamily="18" charset="0"/>
+                                      </a:rPr>
+                                      <m:t>𝑁</m:t>
+                                    </m:r>
+                                    <m:r>
+                                      <a:rPr lang="pt-PT" b="0" i="1" baseline="30000" dirty="0" smtClean="0">
+                                        <a:solidFill>
+                                          <a:schemeClr val="tx1"/>
+                                        </a:solidFill>
+                                        <a:latin typeface="Cambria Math" panose="02040503050406030204" pitchFamily="18" charset="0"/>
+                                        <a:ea typeface="Cambria Math" panose="02040503050406030204" pitchFamily="18" charset="0"/>
+                                      </a:rPr>
+                                      <m:t>+</m:t>
+                                    </m:r>
+                                  </m:e>
+                                  <m:e>
+                                    <m:r>
+                                      <a:rPr lang="pt-PT" b="0" i="1" dirty="0" smtClean="0">
+                                        <a:solidFill>
+                                          <a:schemeClr val="tx1"/>
+                                        </a:solidFill>
+                                        <a:latin typeface="Cambria Math" panose="02040503050406030204" pitchFamily="18" charset="0"/>
+                                        <a:ea typeface="Cambria Math" panose="02040503050406030204" pitchFamily="18" charset="0"/>
+                                      </a:rPr>
+                                      <m:t>𝑋</m:t>
+                                    </m:r>
+                                    <m:r>
+                                      <a:rPr lang="pt-PT" b="0" i="1" baseline="-25000" dirty="0" smtClean="0">
+                                        <a:solidFill>
+                                          <a:schemeClr val="tx1"/>
+                                        </a:solidFill>
+                                        <a:latin typeface="Cambria Math" panose="02040503050406030204" pitchFamily="18" charset="0"/>
+                                        <a:ea typeface="Cambria Math" panose="02040503050406030204" pitchFamily="18" charset="0"/>
+                                      </a:rPr>
+                                      <m:t>𝑖</m:t>
+                                    </m:r>
+                                    <m:r>
+                                      <a:rPr lang="pt-PT" b="0" i="1" dirty="0" smtClean="0">
+                                        <a:solidFill>
+                                          <a:schemeClr val="tx1"/>
+                                        </a:solidFill>
+                                        <a:latin typeface="Cambria Math" panose="02040503050406030204" pitchFamily="18" charset="0"/>
+                                        <a:ea typeface="Cambria Math" panose="02040503050406030204" pitchFamily="18" charset="0"/>
+                                      </a:rPr>
+                                      <m:t>, </m:t>
+                                    </m:r>
+                                    <m:r>
+                                      <a:rPr lang="pt-PT" b="0" i="1" dirty="0" smtClean="0">
+                                        <a:solidFill>
+                                          <a:schemeClr val="tx1"/>
+                                        </a:solidFill>
+                                        <a:latin typeface="Cambria Math" panose="02040503050406030204" pitchFamily="18" charset="0"/>
+                                        <a:ea typeface="Cambria Math" panose="02040503050406030204" pitchFamily="18" charset="0"/>
+                                      </a:rPr>
+                                      <m:t>𝑌𝑖</m:t>
+                                    </m:r>
+                                    <m:r>
+                                      <a:rPr lang="pt-PT" b="0" i="1" dirty="0" smtClean="0">
+                                        <a:solidFill>
+                                          <a:schemeClr val="tx1"/>
+                                        </a:solidFill>
+                                        <a:latin typeface="Cambria Math" panose="02040503050406030204" pitchFamily="18" charset="0"/>
+                                        <a:ea typeface="Cambria Math" panose="02040503050406030204" pitchFamily="18" charset="0"/>
+                                      </a:rPr>
+                                      <m:t>, </m:t>
+                                    </m:r>
+                                    <m:r>
+                                      <a:rPr lang="pt-PT" b="0" i="1" dirty="0" smtClean="0">
+                                        <a:solidFill>
+                                          <a:schemeClr val="tx1"/>
+                                        </a:solidFill>
+                                        <a:latin typeface="Cambria Math" panose="02040503050406030204" pitchFamily="18" charset="0"/>
+                                        <a:ea typeface="Cambria Math" panose="02040503050406030204" pitchFamily="18" charset="0"/>
+                                      </a:rPr>
+                                      <m:t>𝑧𝑗𝑖</m:t>
+                                    </m:r>
+                                    <m:r>
+                                      <a:rPr lang="pt-PT" b="0" i="1" dirty="0" smtClean="0">
+                                        <a:solidFill>
+                                          <a:schemeClr val="tx1"/>
+                                        </a:solidFill>
+                                        <a:latin typeface="Cambria Math" panose="02040503050406030204" pitchFamily="18" charset="0"/>
+                                        <a:ea typeface="Cambria Math" panose="02040503050406030204" pitchFamily="18" charset="0"/>
+                                      </a:rPr>
+                                      <m:t> ∈{0, 1}</m:t>
+                                    </m:r>
+                                  </m:e>
+                                </m:eqArr>
+                              </m:e>
+                            </m:mr>
+                            <m:mr>
+                              <m:e>
+                                <m:r>
+                                  <a:rPr lang="pt-PT" b="0" i="0" dirty="0" smtClean="0">
+                                    <a:solidFill>
+                                      <a:schemeClr val="tx1"/>
+                                    </a:solidFill>
+                                    <a:latin typeface="Cambria Math" panose="02040503050406030204" pitchFamily="18" charset="0"/>
+                                  </a:rPr>
+                                  <m:t>,</m:t>
+                                </m:r>
+                              </m:e>
+                            </m:mr>
+                          </m:m>
+                        </m:e>
+                      </m:d>
+                    </m:oMath>
+                  </m:oMathPara>
+                </a14:m>
+                <a:endParaRPr lang="pt-PT" dirty="0"/>
+              </a:p>
+            </p:txBody>
+          </p:sp>
+        </mc:Choice>
+        <mc:Fallback>
+          <p:sp>
+            <p:nvSpPr>
+              <p:cNvPr id="4" name="CaixaDeTexto 3">
+                <a:extLst>
+                  <a:ext uri="{FF2B5EF4-FFF2-40B4-BE49-F238E27FC236}">
+                    <a16:creationId xmlns:a16="http://schemas.microsoft.com/office/drawing/2014/main" id="{8DF507FA-16F2-49C7-83E2-F5B4AE4274E0}"/>
+                  </a:ext>
+                </a:extLst>
+              </p:cNvPr>
+              <p:cNvSpPr txBox="1">
+                <a:spLocks noRot="1" noChangeAspect="1" noMove="1" noResize="1" noEditPoints="1" noAdjustHandles="1" noChangeArrowheads="1" noChangeShapeType="1" noTextEdit="1"/>
+              </p:cNvSpPr>
+              <p:nvPr/>
+            </p:nvSpPr>
+            <p:spPr>
+              <a:xfrm>
+                <a:off x="542924" y="3648075"/>
+                <a:ext cx="2943226" cy="2295308"/>
+              </a:xfrm>
+              <a:prstGeom prst="rect">
+                <a:avLst/>
+              </a:prstGeom>
+              <a:blipFill>
+                <a:blip r:embed="rId3"/>
+                <a:stretch>
+                  <a:fillRect/>
+                </a:stretch>
+              </a:blipFill>
+            </p:spPr>
+            <p:txBody>
+              <a:bodyPr/>
+              <a:lstStyle/>
+              <a:p>
+                <a:r>
+                  <a:rPr lang="pt-PT">
+                    <a:noFill/>
+                  </a:rPr>
+                  <a:t> </a:t>
+                </a:r>
+              </a:p>
+            </p:txBody>
+          </p:sp>
+        </mc:Fallback>
+      </mc:AlternateContent>
+      <p:sp>
+        <p:nvSpPr>
+          <p:cNvPr id="5" name="CaixaDeTexto 4">
+            <a:extLst>
+              <a:ext uri="{FF2B5EF4-FFF2-40B4-BE49-F238E27FC236}">
+                <a16:creationId xmlns:a16="http://schemas.microsoft.com/office/drawing/2014/main" id="{862EA5EE-FC87-43E4-A400-0A56EA0D4C10}"/>
+              </a:ext>
+            </a:extLst>
+          </p:cNvPr>
+          <p:cNvSpPr txBox="1"/>
+          <p:nvPr/>
+        </p:nvSpPr>
+        <p:spPr>
+          <a:xfrm>
+            <a:off x="3333750" y="4001854"/>
+            <a:ext cx="7800975" cy="1569660"/>
+          </a:xfrm>
+          <a:prstGeom prst="rect">
+            <a:avLst/>
+          </a:prstGeom>
+          <a:noFill/>
+        </p:spPr>
+        <p:txBody>
+          <a:bodyPr wrap="square" rtlCol="0">
+            <a:spAutoFit/>
           </a:bodyPr>
           <a:lstStyle/>
           <a:p>
             <a:r>
-              <a:rPr lang="pt-PT" dirty="0"/>
-              <a:t>Na primeira opção, ordenamos as encomendas e os estafetas por ordem decrescente de volume.</a:t>
-            </a:r>
-          </a:p>
-          <a:p>
-            <a:r>
-              <a:rPr lang="pt-PT" dirty="0"/>
-              <a:t>Na segunda opção, ordenamos as encomendas e os estafetas por ordem decrescente de peso.</a:t>
-            </a:r>
-          </a:p>
-          <a:p>
-            <a:r>
-              <a:rPr lang="pt-PT" dirty="0"/>
-              <a:t>Na terceira opção, ordenamos as encomendas e os estafetas por ordem decrescente de peso * volume.</a:t>
-            </a:r>
-          </a:p>
-          <a:p>
-            <a:r>
-              <a:rPr lang="pt-PT" dirty="0"/>
-              <a:t>Na quarta e quinta opções, apenas trocamos a ordem pela qual as encomendas são ordenadas.</a:t>
-            </a:r>
-          </a:p>
-          <a:p>
-            <a:r>
-              <a:rPr lang="pt-PT" dirty="0"/>
-              <a:t>Atribuímos encomendas a um estafeta até este não conseguir transportar mais, até acabarem os estafetas ou as encomendas.</a:t>
-            </a:r>
-          </a:p>
-          <a:p>
-            <a:r>
-              <a:rPr lang="pt-PT" dirty="0"/>
-              <a:t>Esta solução é baseada no algoritmo </a:t>
-            </a:r>
-            <a:r>
-              <a:rPr lang="pt-PT" dirty="0" err="1"/>
-              <a:t>First</a:t>
-            </a:r>
-            <a:r>
-              <a:rPr lang="pt-PT" dirty="0"/>
-              <a:t> </a:t>
-            </a:r>
-            <a:r>
-              <a:rPr lang="pt-PT" dirty="0" err="1"/>
-              <a:t>Fit</a:t>
-            </a:r>
-            <a:r>
-              <a:rPr lang="pt-PT" dirty="0"/>
+              <a:rPr lang="pt-PT" sz="2400" dirty="0"/>
+              <a:t>, onde </a:t>
+            </a:r>
+            <a:r>
+              <a:rPr lang="pt-PT" sz="2400" dirty="0" err="1"/>
+              <a:t>P</a:t>
+            </a:r>
+            <a:r>
+              <a:rPr lang="pt-PT" sz="2400" baseline="-25000" dirty="0" err="1"/>
+              <a:t>j</a:t>
+            </a:r>
+            <a:r>
+              <a:rPr lang="pt-PT" sz="2400" dirty="0"/>
+              <a:t> é o peso máximo que o estafeta j pode transportar, p</a:t>
+            </a:r>
+            <a:r>
+              <a:rPr lang="pt-PT" sz="2400" baseline="-25000" dirty="0"/>
+              <a:t>i</a:t>
+            </a:r>
+            <a:r>
+              <a:rPr lang="pt-PT" sz="2400" dirty="0"/>
+              <a:t> é o peso da encomenda i, </a:t>
+            </a:r>
+            <a:r>
+              <a:rPr lang="pt-PT" sz="2400" dirty="0" err="1"/>
+              <a:t>V</a:t>
+            </a:r>
+            <a:r>
+              <a:rPr lang="pt-PT" sz="2400" baseline="-25000" dirty="0" err="1"/>
+              <a:t>j</a:t>
+            </a:r>
+            <a:r>
+              <a:rPr lang="pt-PT" sz="2400" dirty="0"/>
+              <a:t> é o volume máximo que o estafeta j pode transportar, v</a:t>
+            </a:r>
+            <a:r>
+              <a:rPr lang="pt-PT" sz="2400" baseline="-25000" dirty="0"/>
+              <a:t>i</a:t>
+            </a:r>
+            <a:r>
+              <a:rPr lang="pt-PT" sz="2400" dirty="0"/>
+              <a:t> é o volume da encomenda i, </a:t>
+            </a:r>
+            <a:r>
+              <a:rPr lang="pt-PT" sz="2400" dirty="0" err="1"/>
+              <a:t>z</a:t>
+            </a:r>
+            <a:r>
+              <a:rPr lang="pt-PT" sz="2400" baseline="-25000" dirty="0" err="1"/>
+              <a:t>ji</a:t>
+            </a:r>
+            <a:r>
+              <a:rPr lang="pt-PT" sz="2400" dirty="0"/>
+              <a:t> é 1 se a encomenda i pertence ao estafeta j, senão 0</a:t>
+            </a:r>
+            <a:r>
+              <a:rPr lang="pt-PT" sz="2000" dirty="0"/>
               <a:t>.</a:t>
             </a:r>
           </a:p>
@@ -4930,7 +5994,7 @@
     </p:spTree>
     <p:extLst>
       <p:ext uri="{BB962C8B-B14F-4D97-AF65-F5344CB8AC3E}">
-        <p14:creationId xmlns:p14="http://schemas.microsoft.com/office/powerpoint/2010/main" val="2252853251"/>
+        <p14:creationId xmlns:p14="http://schemas.microsoft.com/office/powerpoint/2010/main" val="2084837986"/>
       </p:ext>
     </p:extLst>
   </p:cSld>
@@ -4962,7 +6026,7 @@
           <p:cNvPr id="2" name="Título 1">
             <a:extLst>
               <a:ext uri="{FF2B5EF4-FFF2-40B4-BE49-F238E27FC236}">
-                <a16:creationId xmlns:a16="http://schemas.microsoft.com/office/drawing/2014/main" id="{9AC486CE-5A93-43F0-9043-13C5AF3CF887}"/>
+                <a16:creationId xmlns:a16="http://schemas.microsoft.com/office/drawing/2014/main" id="{ADDDF31B-7C36-4052-A8DB-A41E32426F4B}"/>
               </a:ext>
             </a:extLst>
           </p:cNvPr>
@@ -4980,7 +6044,7 @@
           <a:p>
             <a:r>
               <a:rPr lang="pt-PT" dirty="0"/>
-              <a:t>Cenário 1 – Análise da complexidade</a:t>
+              <a:t>Cenário 1 – Algoritmos relevantes</a:t>
             </a:r>
           </a:p>
         </p:txBody>
@@ -4990,7 +6054,7 @@
           <p:cNvPr id="3" name="Marcador de Posição de Conteúdo 2">
             <a:extLst>
               <a:ext uri="{FF2B5EF4-FFF2-40B4-BE49-F238E27FC236}">
-                <a16:creationId xmlns:a16="http://schemas.microsoft.com/office/drawing/2014/main" id="{185F2A2E-FEE2-4742-95E2-7C0CD032DBD6}"/>
+                <a16:creationId xmlns:a16="http://schemas.microsoft.com/office/drawing/2014/main" id="{9467406C-A16F-4E5B-8CA9-2192D2CDADF3}"/>
               </a:ext>
             </a:extLst>
           </p:cNvPr>
@@ -5003,26 +6067,68 @@
         </p:nvSpPr>
         <p:spPr/>
         <p:txBody>
-          <a:bodyPr/>
-          <a:lstStyle/>
-          <a:p>
-            <a:r>
-              <a:rPr lang="pt-PT" dirty="0"/>
-              <a:t>As ordenações têm complexidade O(V log V + E log E).</a:t>
-            </a:r>
-          </a:p>
-          <a:p>
-            <a:r>
-              <a:rPr lang="pt-PT" dirty="0"/>
-              <a:t>A atribuição de encomendas a estafetas tem complexidade O(V + E) no pior dos casos, em que V representa os estafetas e </a:t>
+          <a:bodyPr>
+            <a:normAutofit fontScale="92500" lnSpcReduction="10000"/>
+          </a:bodyPr>
+          <a:lstStyle/>
+          <a:p>
+            <a:r>
+              <a:rPr lang="pt-PT" dirty="0"/>
+              <a:t>Na primeira opção, ordenamos as encomendas e os estafetas por ordem decrescente de volume.</a:t>
+            </a:r>
+          </a:p>
+          <a:p>
+            <a:r>
+              <a:rPr lang="pt-PT" dirty="0"/>
+              <a:t>Na segunda opção, ordenamos as encomendas e os estafetas por ordem decrescente de peso.</a:t>
+            </a:r>
+          </a:p>
+          <a:p>
+            <a:r>
+              <a:rPr lang="pt-PT" dirty="0"/>
+              <a:t>Na terceira opção, ordenamos as encomendas e os estafetas por ordem decrescente de peso * volume.</a:t>
+            </a:r>
+          </a:p>
+          <a:p>
+            <a:r>
+              <a:rPr lang="pt-PT" dirty="0"/>
+              <a:t>Na quarta e quinta opções, apenas trocamos a ordem pela qual as encomendas são ordenadas.</a:t>
+            </a:r>
+          </a:p>
+          <a:p>
+            <a:r>
+              <a:rPr lang="pt-PT" dirty="0"/>
+              <a:t>Atribuímos encomendas a um estafeta até este não conseguir transportar mais, até acabarem os estafetas ou as encomendas.</a:t>
+            </a:r>
+          </a:p>
+          <a:p>
+            <a:r>
+              <a:rPr lang="pt-PT" dirty="0"/>
+              <a:t>Esta solução é baseada no algoritmo </a:t>
             </a:r>
             <a:r>
               <a:rPr lang="pt-PT" dirty="0" err="1"/>
-              <a:t>E</a:t>
-            </a:r>
-            <a:r>
-              <a:rPr lang="pt-PT" dirty="0"/>
-              <a:t> as encomendas.</a:t>
+              <a:t>First</a:t>
+            </a:r>
+            <a:r>
+              <a:rPr lang="pt-PT" dirty="0"/>
+              <a:t> </a:t>
+            </a:r>
+            <a:r>
+              <a:rPr lang="pt-PT" dirty="0" err="1"/>
+              <a:t>Fit</a:t>
+            </a:r>
+            <a:r>
+              <a:rPr lang="pt-PT" dirty="0"/>
+              <a:t> Bin </a:t>
+            </a:r>
+            <a:r>
+              <a:rPr lang="pt-PT" dirty="0" err="1"/>
+              <a:t>Packing</a:t>
+            </a:r>
+            <a:r>
+              <a:rPr lang="pt-PT" dirty="0"/>
+              <a:t>.</a:t>
             </a:r>
           </a:p>
         </p:txBody>
@@ -5030,7 +6136,7 @@
     </p:spTree>
     <p:extLst>
       <p:ext uri="{BB962C8B-B14F-4D97-AF65-F5344CB8AC3E}">
-        <p14:creationId xmlns:p14="http://schemas.microsoft.com/office/powerpoint/2010/main" val="4009156078"/>
+        <p14:creationId xmlns:p14="http://schemas.microsoft.com/office/powerpoint/2010/main" val="2252853251"/>
       </p:ext>
     </p:extLst>
   </p:cSld>
@@ -5062,7 +6168,7 @@
           <p:cNvPr id="2" name="Título 1">
             <a:extLst>
               <a:ext uri="{FF2B5EF4-FFF2-40B4-BE49-F238E27FC236}">
-                <a16:creationId xmlns:a16="http://schemas.microsoft.com/office/drawing/2014/main" id="{2A80387F-48DE-4DC8-9B2E-DE7E44C9A381}"/>
+                <a16:creationId xmlns:a16="http://schemas.microsoft.com/office/drawing/2014/main" id="{9AC486CE-5A93-43F0-9043-13C5AF3CF887}"/>
               </a:ext>
             </a:extLst>
           </p:cNvPr>
@@ -5080,7 +6186,7 @@
           <a:p>
             <a:r>
               <a:rPr lang="pt-PT" dirty="0"/>
-              <a:t>Cenário 1 - Resultados</a:t>
+              <a:t>Cenário 1 – Análise da complexidade</a:t>
             </a:r>
           </a:p>
         </p:txBody>
@@ -5090,7 +6196,7 @@
           <p:cNvPr id="3" name="Marcador de Posição de Conteúdo 2">
             <a:extLst>
               <a:ext uri="{FF2B5EF4-FFF2-40B4-BE49-F238E27FC236}">
-                <a16:creationId xmlns:a16="http://schemas.microsoft.com/office/drawing/2014/main" id="{0BE987A0-2F02-4BFF-9E39-B4A4FDAA2A9B}"/>
+                <a16:creationId xmlns:a16="http://schemas.microsoft.com/office/drawing/2014/main" id="{185F2A2E-FEE2-4742-95E2-7C0CD032DBD6}"/>
               </a:ext>
             </a:extLst>
           </p:cNvPr>
@@ -5108,7 +6214,21 @@
           <a:p>
             <a:r>
               <a:rPr lang="pt-PT" dirty="0"/>
-              <a:t>Os melhores resultados foram obtidas com a ordenação pelo peso *  volume.</a:t>
+              <a:t>As ordenações têm complexidade O(V log V + E log E).</a:t>
+            </a:r>
+          </a:p>
+          <a:p>
+            <a:r>
+              <a:rPr lang="pt-PT" dirty="0"/>
+              <a:t>A atribuição de encomendas a estafetas tem complexidade O(V * E) no pior dos casos, em que V representa os estafetas e </a:t>
+            </a:r>
+            <a:r>
+              <a:rPr lang="pt-PT" dirty="0" err="1"/>
+              <a:t>E</a:t>
+            </a:r>
+            <a:r>
+              <a:rPr lang="pt-PT" dirty="0"/>
+              <a:t> as encomendas.</a:t>
             </a:r>
           </a:p>
         </p:txBody>
@@ -5116,7 +6236,7 @@
     </p:spTree>
     <p:extLst>
       <p:ext uri="{BB962C8B-B14F-4D97-AF65-F5344CB8AC3E}">
-        <p14:creationId xmlns:p14="http://schemas.microsoft.com/office/powerpoint/2010/main" val="3149358938"/>
+        <p14:creationId xmlns:p14="http://schemas.microsoft.com/office/powerpoint/2010/main" val="4009156078"/>
       </p:ext>
     </p:extLst>
   </p:cSld>
@@ -5148,7 +6268,7 @@
           <p:cNvPr id="2" name="Título 1">
             <a:extLst>
               <a:ext uri="{FF2B5EF4-FFF2-40B4-BE49-F238E27FC236}">
-                <a16:creationId xmlns:a16="http://schemas.microsoft.com/office/drawing/2014/main" id="{015E0B45-50C8-42EA-97CD-CC015254268F}"/>
+                <a16:creationId xmlns:a16="http://schemas.microsoft.com/office/drawing/2014/main" id="{2A80387F-48DE-4DC8-9B2E-DE7E44C9A381}"/>
               </a:ext>
             </a:extLst>
           </p:cNvPr>
@@ -5166,7 +6286,7 @@
           <a:p>
             <a:r>
               <a:rPr lang="pt-PT" dirty="0"/>
-              <a:t>Cenário 2 - Formalização</a:t>
+              <a:t>Cenário 1 - Resultados</a:t>
             </a:r>
           </a:p>
         </p:txBody>
@@ -5176,7 +6296,7 @@
           <p:cNvPr id="3" name="Marcador de Posição de Conteúdo 2">
             <a:extLst>
               <a:ext uri="{FF2B5EF4-FFF2-40B4-BE49-F238E27FC236}">
-                <a16:creationId xmlns:a16="http://schemas.microsoft.com/office/drawing/2014/main" id="{2895BCBA-2313-4F28-B119-8636B74CB7D5}"/>
+                <a16:creationId xmlns:a16="http://schemas.microsoft.com/office/drawing/2014/main" id="{0BE987A0-2F02-4BFF-9E39-B4A4FDAA2A9B}"/>
               </a:ext>
             </a:extLst>
           </p:cNvPr>
@@ -5187,98 +6307,22 @@
             <p:ph idx="1"/>
           </p:nvPr>
         </p:nvSpPr>
-        <p:spPr>
-          <a:xfrm>
-            <a:off x="838200" y="1854200"/>
-            <a:ext cx="10515600" cy="4351338"/>
-          </a:xfrm>
-        </p:spPr>
-        <p:txBody>
-          <a:bodyPr>
-            <a:normAutofit fontScale="92500" lnSpcReduction="20000"/>
-          </a:bodyPr>
-          <a:lstStyle/>
-          <a:p>
-            <a:r>
-              <a:rPr lang="pt-PT" dirty="0"/>
-              <a:t>Variáveis de decisão:</a:t>
-            </a:r>
-          </a:p>
-          <a:p>
-            <a:pPr lvl="1"/>
-            <a:r>
-              <a:rPr lang="pt-PT" dirty="0"/>
-              <a:t>r, recompensa das encomendas.</a:t>
-            </a:r>
-          </a:p>
-          <a:p>
-            <a:pPr lvl="1"/>
-            <a:r>
-              <a:rPr lang="pt-PT" dirty="0"/>
-              <a:t>c, custo dos estafetas.</a:t>
-            </a:r>
-          </a:p>
-          <a:p>
-            <a:pPr lvl="1"/>
-            <a:r>
-              <a:rPr lang="pt-PT" dirty="0"/>
-              <a:t>n, número de encomendas entregues.</a:t>
-            </a:r>
-          </a:p>
-          <a:p>
-            <a:pPr marL="457200" lvl="1" indent="0">
-              <a:buNone/>
-            </a:pPr>
-            <a:endParaRPr lang="pt-PT" dirty="0"/>
-          </a:p>
-          <a:p>
-            <a:r>
-              <a:rPr lang="pt-PT" dirty="0"/>
-              <a:t>Restrições:</a:t>
-            </a:r>
-          </a:p>
-          <a:p>
-            <a:pPr lvl="1"/>
-            <a:r>
-              <a:rPr lang="pt-PT" dirty="0"/>
-              <a:t>Não exceder o número de encomendas disponíveis.</a:t>
-            </a:r>
-          </a:p>
-          <a:p>
-            <a:pPr lvl="1"/>
-            <a:r>
-              <a:rPr lang="pt-PT" dirty="0"/>
-              <a:t>Não exceder o número de estafetas disponíveis.</a:t>
-            </a:r>
-          </a:p>
-          <a:p>
-            <a:pPr lvl="1"/>
-            <a:r>
-              <a:rPr lang="pt-PT" dirty="0"/>
-              <a:t>As variáveis de decisão podem tomar valores reais positivos.</a:t>
-            </a:r>
-          </a:p>
-          <a:p>
-            <a:endParaRPr lang="pt-PT" dirty="0"/>
-          </a:p>
-          <a:p>
-            <a:r>
-              <a:rPr lang="pt-PT" dirty="0"/>
-              <a:t>Objetivo:</a:t>
-            </a:r>
-          </a:p>
-          <a:p>
-            <a:pPr lvl="1"/>
-            <a:r>
-              <a:rPr lang="pt-PT" dirty="0"/>
-              <a:t>Maximizar o lucro.</a:t>
-            </a:r>
-          </a:p>
-          <a:p>
-            <a:pPr lvl="1"/>
-            <a:r>
-              <a:rPr lang="pt-PT" dirty="0"/>
-              <a:t>Maximizar o número de encomendas entregues.</a:t>
+        <p:spPr/>
+        <p:txBody>
+          <a:bodyPr/>
+          <a:lstStyle/>
+          <a:p>
+            <a:r>
+              <a:rPr lang="pt-PT" dirty="0"/>
+              <a:t>Os melhores resultados foram obtidas com a ordenação das encomendas por ordem decrescente, não havendo diferenças notáveis entre ordenar por volume ou por peso nos </a:t>
+            </a:r>
+            <a:r>
+              <a:rPr lang="pt-PT" dirty="0" err="1"/>
+              <a:t>datasets</a:t>
+            </a:r>
+            <a:r>
+              <a:rPr lang="pt-PT" dirty="0"/>
+              <a:t> analisados.</a:t>
             </a:r>
           </a:p>
         </p:txBody>
@@ -5286,7 +6330,7 @@
     </p:spTree>
     <p:extLst>
       <p:ext uri="{BB962C8B-B14F-4D97-AF65-F5344CB8AC3E}">
-        <p14:creationId xmlns:p14="http://schemas.microsoft.com/office/powerpoint/2010/main" val="1894945131"/>
+        <p14:creationId xmlns:p14="http://schemas.microsoft.com/office/powerpoint/2010/main" val="3149358938"/>
       </p:ext>
     </p:extLst>
   </p:cSld>
@@ -5318,7 +6362,7 @@
           <p:cNvPr id="2" name="Título 1">
             <a:extLst>
               <a:ext uri="{FF2B5EF4-FFF2-40B4-BE49-F238E27FC236}">
-                <a16:creationId xmlns:a16="http://schemas.microsoft.com/office/drawing/2014/main" id="{32399B53-2793-4009-B687-C6C32087F0DB}"/>
+                <a16:creationId xmlns:a16="http://schemas.microsoft.com/office/drawing/2014/main" id="{015E0B45-50C8-42EA-97CD-CC015254268F}"/>
               </a:ext>
             </a:extLst>
           </p:cNvPr>
@@ -5336,7 +6380,7 @@
           <a:p>
             <a:r>
               <a:rPr lang="pt-PT" dirty="0"/>
-              <a:t>Cenário 2 – Algoritmos relevantes</a:t>
+              <a:t>Cenário 2 - Formalização</a:t>
             </a:r>
           </a:p>
         </p:txBody>
@@ -5346,7 +6390,7 @@
           <p:cNvPr id="3" name="Marcador de Posição de Conteúdo 2">
             <a:extLst>
               <a:ext uri="{FF2B5EF4-FFF2-40B4-BE49-F238E27FC236}">
-                <a16:creationId xmlns:a16="http://schemas.microsoft.com/office/drawing/2014/main" id="{9AE51A9C-A4D0-4ADC-BFED-14FF341F49D3}"/>
+                <a16:creationId xmlns:a16="http://schemas.microsoft.com/office/drawing/2014/main" id="{2895BCBA-2313-4F28-B119-8636B74CB7D5}"/>
               </a:ext>
             </a:extLst>
           </p:cNvPr>
@@ -5357,56 +6401,98 @@
             <p:ph idx="1"/>
           </p:nvPr>
         </p:nvSpPr>
-        <p:spPr/>
+        <p:spPr>
+          <a:xfrm>
+            <a:off x="838200" y="1854200"/>
+            <a:ext cx="10515600" cy="4351338"/>
+          </a:xfrm>
+        </p:spPr>
         <p:txBody>
           <a:bodyPr>
-            <a:normAutofit fontScale="92500" lnSpcReduction="10000"/>
+            <a:normAutofit fontScale="92500" lnSpcReduction="20000"/>
           </a:bodyPr>
           <a:lstStyle/>
           <a:p>
             <a:r>
               <a:rPr lang="pt-PT" dirty="0"/>
-              <a:t>Implementamos 2 variantes para este cenário.</a:t>
-            </a:r>
-          </a:p>
-          <a:p>
-            <a:r>
-              <a:rPr lang="pt-PT" dirty="0"/>
-              <a:t>Na primeira, ordenamos as encomendas por ordem decrescente pela fórmula: peso * volume * recompensa. Ordenamos os estafetas por ordem crescente pela fórmula: peso * volume * custo.</a:t>
-            </a:r>
-          </a:p>
-          <a:p>
-            <a:r>
-              <a:rPr lang="pt-PT" dirty="0"/>
-              <a:t>Na segunda, ordenamos as encomendas por ordem crescente pela fórmula: peso * volume / recompensa. Ordenamos os estafetas por ordem decrescente pela fórmula: peso * volume / custo.</a:t>
-            </a:r>
-          </a:p>
-          <a:p>
-            <a:r>
-              <a:rPr lang="pt-PT" dirty="0"/>
-              <a:t>Nas duas variantes, atribuímos encomendas a estafetas até estes não poderem transportar mais, até as encomendas ou o estafetas se esgotarem.</a:t>
-            </a:r>
-          </a:p>
-          <a:p>
-            <a:r>
-              <a:rPr lang="pt-PT" dirty="0"/>
-              <a:t>Esta solução é baseada no algoritmo </a:t>
-            </a:r>
-            <a:r>
-              <a:rPr lang="pt-PT" dirty="0" err="1"/>
-              <a:t>First</a:t>
-            </a:r>
-            <a:r>
-              <a:rPr lang="pt-PT" dirty="0"/>
-              <a:t> </a:t>
-            </a:r>
-            <a:r>
-              <a:rPr lang="pt-PT" dirty="0" err="1"/>
-              <a:t>Fit</a:t>
-            </a:r>
-            <a:r>
-              <a:rPr lang="pt-PT" dirty="0"/>
-              <a:t>.</a:t>
+              <a:t>Variáveis de decisão:</a:t>
+            </a:r>
+          </a:p>
+          <a:p>
+            <a:pPr lvl="1"/>
+            <a:r>
+              <a:rPr lang="pt-PT" dirty="0"/>
+              <a:t>r, recompensa das encomendas.</a:t>
+            </a:r>
+          </a:p>
+          <a:p>
+            <a:pPr lvl="1"/>
+            <a:r>
+              <a:rPr lang="pt-PT" dirty="0"/>
+              <a:t>c, custo dos estafetas.</a:t>
+            </a:r>
+          </a:p>
+          <a:p>
+            <a:pPr lvl="1"/>
+            <a:r>
+              <a:rPr lang="pt-PT" dirty="0"/>
+              <a:t>n, número de encomendas entregues.</a:t>
+            </a:r>
+          </a:p>
+          <a:p>
+            <a:pPr marL="457200" lvl="1" indent="0">
+              <a:buNone/>
+            </a:pPr>
+            <a:endParaRPr lang="pt-PT" dirty="0"/>
+          </a:p>
+          <a:p>
+            <a:r>
+              <a:rPr lang="pt-PT" dirty="0"/>
+              <a:t>Restrições:</a:t>
+            </a:r>
+          </a:p>
+          <a:p>
+            <a:pPr lvl="1"/>
+            <a:r>
+              <a:rPr lang="pt-PT" dirty="0"/>
+              <a:t>Não exceder o número de encomendas disponíveis.</a:t>
+            </a:r>
+          </a:p>
+          <a:p>
+            <a:pPr lvl="1"/>
+            <a:r>
+              <a:rPr lang="pt-PT" dirty="0"/>
+              <a:t>Não exceder o número de estafetas disponíveis.</a:t>
+            </a:r>
+          </a:p>
+          <a:p>
+            <a:pPr lvl="1"/>
+            <a:r>
+              <a:rPr lang="pt-PT" dirty="0"/>
+              <a:t>As variáveis de decisão podem tomar valores reais positivos.</a:t>
+            </a:r>
+          </a:p>
+          <a:p>
+            <a:endParaRPr lang="pt-PT" dirty="0"/>
+          </a:p>
+          <a:p>
+            <a:r>
+              <a:rPr lang="pt-PT" dirty="0"/>
+              <a:t>Objetivo:</a:t>
+            </a:r>
+          </a:p>
+          <a:p>
+            <a:pPr lvl="1"/>
+            <a:r>
+              <a:rPr lang="pt-PT" dirty="0"/>
+              <a:t>Maximizar o lucro.</a:t>
+            </a:r>
+          </a:p>
+          <a:p>
+            <a:pPr lvl="1"/>
+            <a:r>
+              <a:rPr lang="pt-PT" dirty="0"/>
+              <a:t>Maximizar o número de encomendas entregues.</a:t>
             </a:r>
           </a:p>
         </p:txBody>
@@ -5414,7 +6500,7 @@
     </p:spTree>
     <p:extLst>
       <p:ext uri="{BB962C8B-B14F-4D97-AF65-F5344CB8AC3E}">
-        <p14:creationId xmlns:p14="http://schemas.microsoft.com/office/powerpoint/2010/main" val="1667884579"/>
+        <p14:creationId xmlns:p14="http://schemas.microsoft.com/office/powerpoint/2010/main" val="1894945131"/>
       </p:ext>
     </p:extLst>
   </p:cSld>
@@ -5446,7 +6532,7 @@
           <p:cNvPr id="2" name="Título 1">
             <a:extLst>
               <a:ext uri="{FF2B5EF4-FFF2-40B4-BE49-F238E27FC236}">
-                <a16:creationId xmlns:a16="http://schemas.microsoft.com/office/drawing/2014/main" id="{3DB0E28C-6EE9-49F5-A1DC-00CDB48D4B1E}"/>
+                <a16:creationId xmlns:a16="http://schemas.microsoft.com/office/drawing/2014/main" id="{32399B53-2793-4009-B687-C6C32087F0DB}"/>
               </a:ext>
             </a:extLst>
           </p:cNvPr>
@@ -5464,7 +6550,7 @@
           <a:p>
             <a:r>
               <a:rPr lang="pt-PT" dirty="0"/>
-              <a:t>Cenário 2 – Análise da complexidade</a:t>
+              <a:t>Cenário 2 – Algoritmos relevantes</a:t>
             </a:r>
           </a:p>
         </p:txBody>
@@ -5474,7 +6560,7 @@
           <p:cNvPr id="3" name="Marcador de Posição de Conteúdo 2">
             <a:extLst>
               <a:ext uri="{FF2B5EF4-FFF2-40B4-BE49-F238E27FC236}">
-                <a16:creationId xmlns:a16="http://schemas.microsoft.com/office/drawing/2014/main" id="{C706ACC0-DD3C-4491-9F85-1554F9FDC296}"/>
+                <a16:creationId xmlns:a16="http://schemas.microsoft.com/office/drawing/2014/main" id="{9AE51A9C-A4D0-4ADC-BFED-14FF341F49D3}"/>
               </a:ext>
             </a:extLst>
           </p:cNvPr>
@@ -5487,26 +6573,62 @@
         </p:nvSpPr>
         <p:spPr/>
         <p:txBody>
-          <a:bodyPr/>
-          <a:lstStyle/>
-          <a:p>
-            <a:r>
-              <a:rPr lang="pt-PT" dirty="0"/>
-              <a:t>As ordenações têm complexidade O(V log V + E log E).</a:t>
-            </a:r>
-          </a:p>
-          <a:p>
-            <a:r>
-              <a:rPr lang="pt-PT" dirty="0"/>
-              <a:t>A atribuição de encomendas a estafetas tem complexidade O(V + E) no pior dos casos, em que V são os estafetas e </a:t>
+          <a:bodyPr>
+            <a:normAutofit fontScale="92500" lnSpcReduction="10000"/>
+          </a:bodyPr>
+          <a:lstStyle/>
+          <a:p>
+            <a:r>
+              <a:rPr lang="pt-PT" dirty="0"/>
+              <a:t>Implementamos 2 variantes para este cenário.</a:t>
+            </a:r>
+          </a:p>
+          <a:p>
+            <a:r>
+              <a:rPr lang="pt-PT" dirty="0"/>
+              <a:t>Na primeira, ordenamos as encomendas por ordem decrescente pela fórmula: peso * volume * recompensa. Ordenamos os estafetas por ordem crescente pela fórmula: peso * volume * custo.</a:t>
+            </a:r>
+          </a:p>
+          <a:p>
+            <a:r>
+              <a:rPr lang="pt-PT" dirty="0"/>
+              <a:t>Na segunda, ordenamos as encomendas por ordem crescente pela fórmula: peso * volume / recompensa. Ordenamos os estafetas por ordem decrescente pela fórmula: peso * volume / custo.</a:t>
+            </a:r>
+          </a:p>
+          <a:p>
+            <a:r>
+              <a:rPr lang="pt-PT" dirty="0"/>
+              <a:t>Nas duas variantes, atribuímos encomendas a estafetas até estes não poderem transportar mais, até as encomendas ou o estafetas se esgotarem.</a:t>
+            </a:r>
+          </a:p>
+          <a:p>
+            <a:r>
+              <a:rPr lang="pt-PT" dirty="0"/>
+              <a:t>Esta solução é baseada no algoritmo </a:t>
             </a:r>
             <a:r>
               <a:rPr lang="pt-PT" dirty="0" err="1"/>
-              <a:t>E</a:t>
-            </a:r>
-            <a:r>
-              <a:rPr lang="pt-PT" dirty="0"/>
-              <a:t> as encomendas.</a:t>
+              <a:t>First</a:t>
+            </a:r>
+            <a:r>
+              <a:rPr lang="pt-PT" dirty="0"/>
+              <a:t> </a:t>
+            </a:r>
+            <a:r>
+              <a:rPr lang="pt-PT" dirty="0" err="1"/>
+              <a:t>Fit</a:t>
+            </a:r>
+            <a:r>
+              <a:rPr lang="pt-PT" dirty="0"/>
+              <a:t> Bin </a:t>
+            </a:r>
+            <a:r>
+              <a:rPr lang="pt-PT" dirty="0" err="1"/>
+              <a:t>Packing</a:t>
+            </a:r>
+            <a:r>
+              <a:rPr lang="pt-PT" dirty="0"/>
+              <a:t>.</a:t>
             </a:r>
           </a:p>
         </p:txBody>
@@ -5514,7 +6636,7 @@
     </p:spTree>
     <p:extLst>
       <p:ext uri="{BB962C8B-B14F-4D97-AF65-F5344CB8AC3E}">
-        <p14:creationId xmlns:p14="http://schemas.microsoft.com/office/powerpoint/2010/main" val="3392007634"/>
+        <p14:creationId xmlns:p14="http://schemas.microsoft.com/office/powerpoint/2010/main" val="1667884579"/>
       </p:ext>
     </p:extLst>
   </p:cSld>

</xml_diff>